<commit_message>
exercises.html all-slides.pdf functions.pdf functions.pptx
</commit_message>
<xml_diff>
--- a/ipsa/slides/functions.pptx
+++ b/ipsa/slides/functions.pptx
@@ -159,14 +159,6 @@
           <pc:docMk/>
           <pc:sldMk cId="3628447800" sldId="561"/>
         </pc:sldMkLst>
-        <pc:spChg chg="mod">
-          <ac:chgData name="Gerth Stølting Brodal" userId="04ef4784-6591-4f86-a140-f5c3b108582a" providerId="ADAL" clId="{6E9A0562-012B-4102-8D64-466128A30A98}" dt="2021-02-23T09:29:00.718" v="2" actId="114"/>
-          <ac:spMkLst>
-            <pc:docMk/>
-            <pc:sldMk cId="3628447800" sldId="561"/>
-            <ac:spMk id="3" creationId="{00000000-0000-0000-0000-000000000000}"/>
-          </ac:spMkLst>
-        </pc:spChg>
       </pc:sldChg>
       <pc:sldChg chg="modSp mod">
         <pc:chgData name="Gerth Stølting Brodal" userId="04ef4784-6591-4f86-a140-f5c3b108582a" providerId="ADAL" clId="{6E9A0562-012B-4102-8D64-466128A30A98}" dt="2021-02-23T09:55:54.848" v="515" actId="6549"/>
@@ -174,14 +166,6 @@
           <pc:docMk/>
           <pc:sldMk cId="188061130" sldId="564"/>
         </pc:sldMkLst>
-        <pc:graphicFrameChg chg="modGraphic">
-          <ac:chgData name="Gerth Stølting Brodal" userId="04ef4784-6591-4f86-a140-f5c3b108582a" providerId="ADAL" clId="{6E9A0562-012B-4102-8D64-466128A30A98}" dt="2021-02-23T09:55:54.848" v="515" actId="6549"/>
-          <ac:graphicFrameMkLst>
-            <pc:docMk/>
-            <pc:sldMk cId="188061130" sldId="564"/>
-            <ac:graphicFrameMk id="6" creationId="{00000000-0000-0000-0000-000000000000}"/>
-          </ac:graphicFrameMkLst>
-        </pc:graphicFrameChg>
       </pc:sldChg>
       <pc:sldChg chg="modSp mod">
         <pc:chgData name="Gerth Stølting Brodal" userId="04ef4784-6591-4f86-a140-f5c3b108582a" providerId="ADAL" clId="{6E9A0562-012B-4102-8D64-466128A30A98}" dt="2021-02-23T10:14:31.547" v="540" actId="20577"/>
@@ -189,22 +173,6 @@
           <pc:docMk/>
           <pc:sldMk cId="3627704936" sldId="566"/>
         </pc:sldMkLst>
-        <pc:spChg chg="mod">
-          <ac:chgData name="Gerth Stølting Brodal" userId="04ef4784-6591-4f86-a140-f5c3b108582a" providerId="ADAL" clId="{6E9A0562-012B-4102-8D64-466128A30A98}" dt="2021-02-23T10:14:31.547" v="540" actId="20577"/>
-          <ac:spMkLst>
-            <pc:docMk/>
-            <pc:sldMk cId="3627704936" sldId="566"/>
-            <ac:spMk id="3" creationId="{00000000-0000-0000-0000-000000000000}"/>
-          </ac:spMkLst>
-        </pc:spChg>
-        <pc:graphicFrameChg chg="mod">
-          <ac:chgData name="Gerth Stølting Brodal" userId="04ef4784-6591-4f86-a140-f5c3b108582a" providerId="ADAL" clId="{6E9A0562-012B-4102-8D64-466128A30A98}" dt="2021-02-23T10:02:55.287" v="538" actId="1076"/>
-          <ac:graphicFrameMkLst>
-            <pc:docMk/>
-            <pc:sldMk cId="3627704936" sldId="566"/>
-            <ac:graphicFrameMk id="4" creationId="{00000000-0000-0000-0000-000000000000}"/>
-          </ac:graphicFrameMkLst>
-        </pc:graphicFrameChg>
       </pc:sldChg>
       <pc:sldChg chg="modSp mod">
         <pc:chgData name="Gerth Stølting Brodal" userId="04ef4784-6591-4f86-a140-f5c3b108582a" providerId="ADAL" clId="{6E9A0562-012B-4102-8D64-466128A30A98}" dt="2021-02-23T11:20:05.903" v="1079" actId="20577"/>
@@ -212,14 +180,6 @@
           <pc:docMk/>
           <pc:sldMk cId="3579293872" sldId="577"/>
         </pc:sldMkLst>
-        <pc:spChg chg="mod">
-          <ac:chgData name="Gerth Stølting Brodal" userId="04ef4784-6591-4f86-a140-f5c3b108582a" providerId="ADAL" clId="{6E9A0562-012B-4102-8D64-466128A30A98}" dt="2021-02-23T11:20:05.903" v="1079" actId="20577"/>
-          <ac:spMkLst>
-            <pc:docMk/>
-            <pc:sldMk cId="3579293872" sldId="577"/>
-            <ac:spMk id="3" creationId="{00000000-0000-0000-0000-000000000000}"/>
-          </ac:spMkLst>
-        </pc:spChg>
       </pc:sldChg>
       <pc:sldChg chg="modNotesTx">
         <pc:chgData name="Gerth Stølting Brodal" userId="04ef4784-6591-4f86-a140-f5c3b108582a" providerId="ADAL" clId="{6E9A0562-012B-4102-8D64-466128A30A98}" dt="2021-02-23T10:35:56.560" v="699" actId="20577"/>
@@ -234,110 +194,6 @@
           <pc:docMk/>
           <pc:sldMk cId="4039368805" sldId="589"/>
         </pc:sldMkLst>
-        <pc:spChg chg="mod">
-          <ac:chgData name="Gerth Stølting Brodal" userId="04ef4784-6591-4f86-a140-f5c3b108582a" providerId="ADAL" clId="{6E9A0562-012B-4102-8D64-466128A30A98}" dt="2021-02-23T09:43:44.763" v="340" actId="26606"/>
-          <ac:spMkLst>
-            <pc:docMk/>
-            <pc:sldMk cId="4039368805" sldId="589"/>
-            <ac:spMk id="2" creationId="{00000000-0000-0000-0000-000000000000}"/>
-          </ac:spMkLst>
-        </pc:spChg>
-        <pc:spChg chg="mod">
-          <ac:chgData name="Gerth Stølting Brodal" userId="04ef4784-6591-4f86-a140-f5c3b108582a" providerId="ADAL" clId="{6E9A0562-012B-4102-8D64-466128A30A98}" dt="2021-02-23T09:54:05.032" v="450" actId="20577"/>
-          <ac:spMkLst>
-            <pc:docMk/>
-            <pc:sldMk cId="4039368805" sldId="589"/>
-            <ac:spMk id="3" creationId="{00000000-0000-0000-0000-000000000000}"/>
-          </ac:spMkLst>
-        </pc:spChg>
-        <pc:spChg chg="del">
-          <ac:chgData name="Gerth Stølting Brodal" userId="04ef4784-6591-4f86-a140-f5c3b108582a" providerId="ADAL" clId="{6E9A0562-012B-4102-8D64-466128A30A98}" dt="2021-02-23T09:39:01.872" v="40" actId="478"/>
-          <ac:spMkLst>
-            <pc:docMk/>
-            <pc:sldMk cId="4039368805" sldId="589"/>
-            <ac:spMk id="7" creationId="{00000000-0000-0000-0000-000000000000}"/>
-          </ac:spMkLst>
-        </pc:spChg>
-        <pc:spChg chg="add del">
-          <ac:chgData name="Gerth Stølting Brodal" userId="04ef4784-6591-4f86-a140-f5c3b108582a" providerId="ADAL" clId="{6E9A0562-012B-4102-8D64-466128A30A98}" dt="2021-02-23T09:43:42.540" v="338" actId="26606"/>
-          <ac:spMkLst>
-            <pc:docMk/>
-            <pc:sldMk cId="4039368805" sldId="589"/>
-            <ac:spMk id="10" creationId="{385E1BDC-A9B0-4A87-82E3-F3187F69A802}"/>
-          </ac:spMkLst>
-        </pc:spChg>
-        <pc:spChg chg="add del">
-          <ac:chgData name="Gerth Stølting Brodal" userId="04ef4784-6591-4f86-a140-f5c3b108582a" providerId="ADAL" clId="{6E9A0562-012B-4102-8D64-466128A30A98}" dt="2021-02-23T09:43:42.540" v="338" actId="26606"/>
-          <ac:spMkLst>
-            <pc:docMk/>
-            <pc:sldMk cId="4039368805" sldId="589"/>
-            <ac:spMk id="11" creationId="{0990C621-3B8B-4820-8328-D47EF7CE823C}"/>
-          </ac:spMkLst>
-        </pc:spChg>
-        <pc:spChg chg="add del">
-          <ac:chgData name="Gerth Stølting Brodal" userId="04ef4784-6591-4f86-a140-f5c3b108582a" providerId="ADAL" clId="{6E9A0562-012B-4102-8D64-466128A30A98}" dt="2021-02-23T09:43:44.763" v="340" actId="26606"/>
-          <ac:spMkLst>
-            <pc:docMk/>
-            <pc:sldMk cId="4039368805" sldId="589"/>
-            <ac:spMk id="12" creationId="{E02F3C71-C981-4614-98EA-D6C494F8091E}"/>
-          </ac:spMkLst>
-        </pc:spChg>
-        <pc:spChg chg="add del">
-          <ac:chgData name="Gerth Stølting Brodal" userId="04ef4784-6591-4f86-a140-f5c3b108582a" providerId="ADAL" clId="{6E9A0562-012B-4102-8D64-466128A30A98}" dt="2021-02-23T09:43:39.833" v="336" actId="26606"/>
-          <ac:spMkLst>
-            <pc:docMk/>
-            <pc:sldMk cId="4039368805" sldId="589"/>
-            <ac:spMk id="13" creationId="{5E52985E-2553-471E-82AA-5ED7A329890A}"/>
-          </ac:spMkLst>
-        </pc:spChg>
-        <pc:spChg chg="add del">
-          <ac:chgData name="Gerth Stølting Brodal" userId="04ef4784-6591-4f86-a140-f5c3b108582a" providerId="ADAL" clId="{6E9A0562-012B-4102-8D64-466128A30A98}" dt="2021-02-23T09:43:42.540" v="338" actId="26606"/>
-          <ac:spMkLst>
-            <pc:docMk/>
-            <pc:sldMk cId="4039368805" sldId="589"/>
-            <ac:spMk id="17" creationId="{C1A2385B-1D2A-4E17-84FA-6CB7F0AAE473}"/>
-          </ac:spMkLst>
-        </pc:spChg>
-        <pc:spChg chg="add del">
-          <ac:chgData name="Gerth Stølting Brodal" userId="04ef4784-6591-4f86-a140-f5c3b108582a" providerId="ADAL" clId="{6E9A0562-012B-4102-8D64-466128A30A98}" dt="2021-02-23T09:43:42.540" v="338" actId="26606"/>
-          <ac:spMkLst>
-            <pc:docMk/>
-            <pc:sldMk cId="4039368805" sldId="589"/>
-            <ac:spMk id="19" creationId="{5E791F2F-79DB-4CC0-9FA1-001E3E91E8B7}"/>
-          </ac:spMkLst>
-        </pc:spChg>
-        <pc:graphicFrameChg chg="add mod ord modGraphic">
-          <ac:chgData name="Gerth Stølting Brodal" userId="04ef4784-6591-4f86-a140-f5c3b108582a" providerId="ADAL" clId="{6E9A0562-012B-4102-8D64-466128A30A98}" dt="2021-02-23T10:49:22.669" v="725" actId="20577"/>
-          <ac:graphicFrameMkLst>
-            <pc:docMk/>
-            <pc:sldMk cId="4039368805" sldId="589"/>
-            <ac:graphicFrameMk id="4" creationId="{00000000-0000-0000-0000-000000000000}"/>
-          </ac:graphicFrameMkLst>
-        </pc:graphicFrameChg>
-        <pc:graphicFrameChg chg="del">
-          <ac:chgData name="Gerth Stølting Brodal" userId="04ef4784-6591-4f86-a140-f5c3b108582a" providerId="ADAL" clId="{6E9A0562-012B-4102-8D64-466128A30A98}" dt="2021-02-23T09:39:00.184" v="39" actId="478"/>
-          <ac:graphicFrameMkLst>
-            <pc:docMk/>
-            <pc:sldMk cId="4039368805" sldId="589"/>
-            <ac:graphicFrameMk id="6" creationId="{00000000-0000-0000-0000-000000000000}"/>
-          </ac:graphicFrameMkLst>
-        </pc:graphicFrameChg>
-        <pc:picChg chg="add mod">
-          <ac:chgData name="Gerth Stølting Brodal" userId="04ef4784-6591-4f86-a140-f5c3b108582a" providerId="ADAL" clId="{6E9A0562-012B-4102-8D64-466128A30A98}" dt="2021-02-23T09:55:13.412" v="509" actId="1076"/>
-          <ac:picMkLst>
-            <pc:docMk/>
-            <pc:sldMk cId="4039368805" sldId="589"/>
-            <ac:picMk id="8" creationId="{A96F7339-01C6-4D51-8A22-DF79E2AC0BA3}"/>
-          </ac:picMkLst>
-        </pc:picChg>
-        <pc:cxnChg chg="add del">
-          <ac:chgData name="Gerth Stølting Brodal" userId="04ef4784-6591-4f86-a140-f5c3b108582a" providerId="ADAL" clId="{6E9A0562-012B-4102-8D64-466128A30A98}" dt="2021-02-23T09:43:39.833" v="336" actId="26606"/>
-          <ac:cxnSpMkLst>
-            <pc:docMk/>
-            <pc:sldMk cId="4039368805" sldId="589"/>
-            <ac:cxnSpMk id="15" creationId="{DAE3ABC6-4042-4293-A7DF-F01181363B7E}"/>
-          </ac:cxnSpMkLst>
-        </pc:cxnChg>
       </pc:sldChg>
       <pc:sldChg chg="addSp modSp new mod modNotesTx">
         <pc:chgData name="Gerth Stølting Brodal" userId="04ef4784-6591-4f86-a140-f5c3b108582a" providerId="ADAL" clId="{6E9A0562-012B-4102-8D64-466128A30A98}" dt="2021-02-24T12:05:02.031" v="1363" actId="20577"/>
@@ -345,30 +201,6 @@
           <pc:docMk/>
           <pc:sldMk cId="3860775354" sldId="590"/>
         </pc:sldMkLst>
-        <pc:spChg chg="mod">
-          <ac:chgData name="Gerth Stølting Brodal" userId="04ef4784-6591-4f86-a140-f5c3b108582a" providerId="ADAL" clId="{6E9A0562-012B-4102-8D64-466128A30A98}" dt="2021-02-23T10:54:04.529" v="811" actId="20577"/>
-          <ac:spMkLst>
-            <pc:docMk/>
-            <pc:sldMk cId="3860775354" sldId="590"/>
-            <ac:spMk id="2" creationId="{E3CAA890-3D7B-4AF2-8EE3-A2330FDC93BB}"/>
-          </ac:spMkLst>
-        </pc:spChg>
-        <pc:spChg chg="mod">
-          <ac:chgData name="Gerth Stølting Brodal" userId="04ef4784-6591-4f86-a140-f5c3b108582a" providerId="ADAL" clId="{6E9A0562-012B-4102-8D64-466128A30A98}" dt="2021-02-23T11:18:53.290" v="1078" actId="14100"/>
-          <ac:spMkLst>
-            <pc:docMk/>
-            <pc:sldMk cId="3860775354" sldId="590"/>
-            <ac:spMk id="3" creationId="{833CE651-B63C-4186-9D3C-ECB731028B26}"/>
-          </ac:spMkLst>
-        </pc:spChg>
-        <pc:graphicFrameChg chg="add mod modGraphic">
-          <ac:chgData name="Gerth Stølting Brodal" userId="04ef4784-6591-4f86-a140-f5c3b108582a" providerId="ADAL" clId="{6E9A0562-012B-4102-8D64-466128A30A98}" dt="2021-02-23T11:42:02.995" v="1142" actId="20577"/>
-          <ac:graphicFrameMkLst>
-            <pc:docMk/>
-            <pc:sldMk cId="3860775354" sldId="590"/>
-            <ac:graphicFrameMk id="4" creationId="{6BED2BDB-4A2A-4BC5-9602-B2AE80CB68C7}"/>
-          </ac:graphicFrameMkLst>
-        </pc:graphicFrameChg>
       </pc:sldChg>
     </pc:docChg>
   </pc:docChgLst>
@@ -385,14 +217,6 @@
           <pc:docMk/>
           <pc:sldMk cId="328718495" sldId="401"/>
         </pc:sldMkLst>
-        <pc:spChg chg="mod">
-          <ac:chgData name="Gerth Stølting Brodal" userId="04ef4784-6591-4f86-a140-f5c3b108582a" providerId="ADAL" clId="{754E53C0-86C1-454F-8E62-4CC3B55D8DD3}" dt="2022-02-19T11:20:15.711" v="5" actId="1076"/>
-          <ac:spMkLst>
-            <pc:docMk/>
-            <pc:sldMk cId="328718495" sldId="401"/>
-            <ac:spMk id="3" creationId="{00000000-0000-0000-0000-000000000000}"/>
-          </ac:spMkLst>
-        </pc:spChg>
       </pc:sldChg>
       <pc:sldChg chg="modNotesTx">
         <pc:chgData name="Gerth Stølting Brodal" userId="04ef4784-6591-4f86-a140-f5c3b108582a" providerId="ADAL" clId="{754E53C0-86C1-454F-8E62-4CC3B55D8DD3}" dt="2022-02-23T08:18:55.822" v="64"/>
@@ -407,14 +231,6 @@
           <pc:docMk/>
           <pc:sldMk cId="905431858" sldId="569"/>
         </pc:sldMkLst>
-        <pc:spChg chg="mod">
-          <ac:chgData name="Gerth Stølting Brodal" userId="04ef4784-6591-4f86-a140-f5c3b108582a" providerId="ADAL" clId="{754E53C0-86C1-454F-8E62-4CC3B55D8DD3}" dt="2022-02-19T11:34:56.486" v="12" actId="948"/>
-          <ac:spMkLst>
-            <pc:docMk/>
-            <pc:sldMk cId="905431858" sldId="569"/>
-            <ac:spMk id="3" creationId="{00000000-0000-0000-0000-000000000000}"/>
-          </ac:spMkLst>
-        </pc:spChg>
       </pc:sldChg>
       <pc:sldChg chg="modSp mod">
         <pc:chgData name="Gerth Stølting Brodal" userId="04ef4784-6591-4f86-a140-f5c3b108582a" providerId="ADAL" clId="{754E53C0-86C1-454F-8E62-4CC3B55D8DD3}" dt="2022-02-19T11:46:40.373" v="22" actId="20577"/>
@@ -422,14 +238,6 @@
           <pc:docMk/>
           <pc:sldMk cId="826728691" sldId="578"/>
         </pc:sldMkLst>
-        <pc:graphicFrameChg chg="modGraphic">
-          <ac:chgData name="Gerth Stølting Brodal" userId="04ef4784-6591-4f86-a140-f5c3b108582a" providerId="ADAL" clId="{754E53C0-86C1-454F-8E62-4CC3B55D8DD3}" dt="2022-02-19T11:46:40.373" v="22" actId="20577"/>
-          <ac:graphicFrameMkLst>
-            <pc:docMk/>
-            <pc:sldMk cId="826728691" sldId="578"/>
-            <ac:graphicFrameMk id="7" creationId="{00000000-0000-0000-0000-000000000000}"/>
-          </ac:graphicFrameMkLst>
-        </pc:graphicFrameChg>
       </pc:sldChg>
       <pc:sldChg chg="modSp mod">
         <pc:chgData name="Gerth Stølting Brodal" userId="04ef4784-6591-4f86-a140-f5c3b108582a" providerId="ADAL" clId="{754E53C0-86C1-454F-8E62-4CC3B55D8DD3}" dt="2022-02-19T11:43:34.116" v="20" actId="313"/>
@@ -437,14 +245,6 @@
           <pc:docMk/>
           <pc:sldMk cId="1913637463" sldId="579"/>
         </pc:sldMkLst>
-        <pc:spChg chg="mod">
-          <ac:chgData name="Gerth Stølting Brodal" userId="04ef4784-6591-4f86-a140-f5c3b108582a" providerId="ADAL" clId="{754E53C0-86C1-454F-8E62-4CC3B55D8DD3}" dt="2022-02-19T11:43:34.116" v="20" actId="313"/>
-          <ac:spMkLst>
-            <pc:docMk/>
-            <pc:sldMk cId="1913637463" sldId="579"/>
-            <ac:spMk id="3" creationId="{00000000-0000-0000-0000-000000000000}"/>
-          </ac:spMkLst>
-        </pc:spChg>
       </pc:sldChg>
       <pc:sldChg chg="modSp mod">
         <pc:chgData name="Gerth Stølting Brodal" userId="04ef4784-6591-4f86-a140-f5c3b108582a" providerId="ADAL" clId="{754E53C0-86C1-454F-8E62-4CC3B55D8DD3}" dt="2022-02-23T10:18:56.906" v="135" actId="20577"/>
@@ -452,14 +252,6 @@
           <pc:docMk/>
           <pc:sldMk cId="4009993959" sldId="582"/>
         </pc:sldMkLst>
-        <pc:spChg chg="mod">
-          <ac:chgData name="Gerth Stølting Brodal" userId="04ef4784-6591-4f86-a140-f5c3b108582a" providerId="ADAL" clId="{754E53C0-86C1-454F-8E62-4CC3B55D8DD3}" dt="2022-02-23T10:18:56.906" v="135" actId="20577"/>
-          <ac:spMkLst>
-            <pc:docMk/>
-            <pc:sldMk cId="4009993959" sldId="582"/>
-            <ac:spMk id="3" creationId="{00000000-0000-0000-0000-000000000000}"/>
-          </ac:spMkLst>
-        </pc:spChg>
       </pc:sldChg>
       <pc:sldChg chg="modSp mod">
         <pc:chgData name="Gerth Stølting Brodal" userId="04ef4784-6591-4f86-a140-f5c3b108582a" providerId="ADAL" clId="{754E53C0-86C1-454F-8E62-4CC3B55D8DD3}" dt="2022-02-23T10:15:55.352" v="125" actId="207"/>
@@ -467,14 +259,6 @@
           <pc:docMk/>
           <pc:sldMk cId="1896777206" sldId="585"/>
         </pc:sldMkLst>
-        <pc:spChg chg="mod">
-          <ac:chgData name="Gerth Stølting Brodal" userId="04ef4784-6591-4f86-a140-f5c3b108582a" providerId="ADAL" clId="{754E53C0-86C1-454F-8E62-4CC3B55D8DD3}" dt="2022-02-23T10:15:55.352" v="125" actId="207"/>
-          <ac:spMkLst>
-            <pc:docMk/>
-            <pc:sldMk cId="1896777206" sldId="585"/>
-            <ac:spMk id="3" creationId="{00000000-0000-0000-0000-000000000000}"/>
-          </ac:spMkLst>
-        </pc:spChg>
       </pc:sldChg>
       <pc:sldChg chg="modSp mod">
         <pc:chgData name="Gerth Stølting Brodal" userId="04ef4784-6591-4f86-a140-f5c3b108582a" providerId="ADAL" clId="{754E53C0-86C1-454F-8E62-4CC3B55D8DD3}" dt="2022-02-23T10:12:18.240" v="124" actId="207"/>
@@ -482,14 +266,6 @@
           <pc:docMk/>
           <pc:sldMk cId="653558519" sldId="586"/>
         </pc:sldMkLst>
-        <pc:graphicFrameChg chg="modGraphic">
-          <ac:chgData name="Gerth Stølting Brodal" userId="04ef4784-6591-4f86-a140-f5c3b108582a" providerId="ADAL" clId="{754E53C0-86C1-454F-8E62-4CC3B55D8DD3}" dt="2022-02-23T10:12:18.240" v="124" actId="207"/>
-          <ac:graphicFrameMkLst>
-            <pc:docMk/>
-            <pc:sldMk cId="653558519" sldId="586"/>
-            <ac:graphicFrameMk id="4" creationId="{00000000-0000-0000-0000-000000000000}"/>
-          </ac:graphicFrameMkLst>
-        </pc:graphicFrameChg>
       </pc:sldChg>
       <pc:sldChg chg="modNotesTx">
         <pc:chgData name="Gerth Stølting Brodal" userId="04ef4784-6591-4f86-a140-f5c3b108582a" providerId="ADAL" clId="{754E53C0-86C1-454F-8E62-4CC3B55D8DD3}" dt="2022-02-20T21:10:59.090" v="53" actId="20577"/>
@@ -504,38 +280,6 @@
           <pc:docMk/>
           <pc:sldMk cId="3400063430" sldId="591"/>
         </pc:sldMkLst>
-        <pc:spChg chg="mod">
-          <ac:chgData name="Gerth Stølting Brodal" userId="04ef4784-6591-4f86-a140-f5c3b108582a" providerId="ADAL" clId="{754E53C0-86C1-454F-8E62-4CC3B55D8DD3}" dt="2022-02-24T08:31:14.780" v="150" actId="6549"/>
-          <ac:spMkLst>
-            <pc:docMk/>
-            <pc:sldMk cId="3400063430" sldId="591"/>
-            <ac:spMk id="2" creationId="{00000000-0000-0000-0000-000000000000}"/>
-          </ac:spMkLst>
-        </pc:spChg>
-        <pc:spChg chg="del">
-          <ac:chgData name="Gerth Stølting Brodal" userId="04ef4784-6591-4f86-a140-f5c3b108582a" providerId="ADAL" clId="{754E53C0-86C1-454F-8E62-4CC3B55D8DD3}" dt="2022-02-24T08:33:24.404" v="193" actId="478"/>
-          <ac:spMkLst>
-            <pc:docMk/>
-            <pc:sldMk cId="3400063430" sldId="591"/>
-            <ac:spMk id="3" creationId="{00000000-0000-0000-0000-000000000000}"/>
-          </ac:spMkLst>
-        </pc:spChg>
-        <pc:spChg chg="add del mod">
-          <ac:chgData name="Gerth Stølting Brodal" userId="04ef4784-6591-4f86-a140-f5c3b108582a" providerId="ADAL" clId="{754E53C0-86C1-454F-8E62-4CC3B55D8DD3}" dt="2022-02-24T08:33:26.760" v="194" actId="478"/>
-          <ac:spMkLst>
-            <pc:docMk/>
-            <pc:sldMk cId="3400063430" sldId="591"/>
-            <ac:spMk id="6" creationId="{029EB936-12AD-4170-A489-8AE2ECA7F9FB}"/>
-          </ac:spMkLst>
-        </pc:spChg>
-        <pc:graphicFrameChg chg="mod modGraphic">
-          <ac:chgData name="Gerth Stølting Brodal" userId="04ef4784-6591-4f86-a140-f5c3b108582a" providerId="ADAL" clId="{754E53C0-86C1-454F-8E62-4CC3B55D8DD3}" dt="2022-02-24T08:36:05.368" v="232" actId="1076"/>
-          <ac:graphicFrameMkLst>
-            <pc:docMk/>
-            <pc:sldMk cId="3400063430" sldId="591"/>
-            <ac:graphicFrameMk id="4" creationId="{00000000-0000-0000-0000-000000000000}"/>
-          </ac:graphicFrameMkLst>
-        </pc:graphicFrameChg>
       </pc:sldChg>
     </pc:docChg>
   </pc:docChgLst>
@@ -552,22 +296,6 @@
           <pc:docMk/>
           <pc:sldMk cId="188061130" sldId="564"/>
         </pc:sldMkLst>
-        <pc:graphicFrameChg chg="modGraphic">
-          <ac:chgData name="Gerth Stølting Brodal" userId="04ef4784-6591-4f86-a140-f5c3b108582a" providerId="ADAL" clId="{A438EBA1-DB7D-4DC5-9143-438EE3137945}" dt="2024-02-19T06:43:24.980" v="17" actId="313"/>
-          <ac:graphicFrameMkLst>
-            <pc:docMk/>
-            <pc:sldMk cId="188061130" sldId="564"/>
-            <ac:graphicFrameMk id="4" creationId="{00000000-0000-0000-0000-000000000000}"/>
-          </ac:graphicFrameMkLst>
-        </pc:graphicFrameChg>
-        <pc:graphicFrameChg chg="modGraphic">
-          <ac:chgData name="Gerth Stølting Brodal" userId="04ef4784-6591-4f86-a140-f5c3b108582a" providerId="ADAL" clId="{A438EBA1-DB7D-4DC5-9143-438EE3137945}" dt="2024-02-19T06:43:34.614" v="25" actId="313"/>
-          <ac:graphicFrameMkLst>
-            <pc:docMk/>
-            <pc:sldMk cId="188061130" sldId="564"/>
-            <ac:graphicFrameMk id="6" creationId="{00000000-0000-0000-0000-000000000000}"/>
-          </ac:graphicFrameMkLst>
-        </pc:graphicFrameChg>
       </pc:sldChg>
       <pc:sldChg chg="modSp mod">
         <pc:chgData name="Gerth Stølting Brodal" userId="04ef4784-6591-4f86-a140-f5c3b108582a" providerId="ADAL" clId="{A438EBA1-DB7D-4DC5-9143-438EE3137945}" dt="2024-02-19T07:13:25.896" v="267" actId="207"/>
@@ -575,14 +303,6 @@
           <pc:docMk/>
           <pc:sldMk cId="3627704936" sldId="566"/>
         </pc:sldMkLst>
-        <pc:spChg chg="mod">
-          <ac:chgData name="Gerth Stølting Brodal" userId="04ef4784-6591-4f86-a140-f5c3b108582a" providerId="ADAL" clId="{A438EBA1-DB7D-4DC5-9143-438EE3137945}" dt="2024-02-19T07:13:25.896" v="267" actId="207"/>
-          <ac:spMkLst>
-            <pc:docMk/>
-            <pc:sldMk cId="3627704936" sldId="566"/>
-            <ac:spMk id="3" creationId="{00000000-0000-0000-0000-000000000000}"/>
-          </ac:spMkLst>
-        </pc:spChg>
       </pc:sldChg>
       <pc:sldChg chg="modSp mod modNotesTx">
         <pc:chgData name="Gerth Stølting Brodal" userId="04ef4784-6591-4f86-a140-f5c3b108582a" providerId="ADAL" clId="{A438EBA1-DB7D-4DC5-9143-438EE3137945}" dt="2024-02-19T06:59:06.914" v="266" actId="20577"/>
@@ -590,22 +310,6 @@
           <pc:docMk/>
           <pc:sldMk cId="100858788" sldId="568"/>
         </pc:sldMkLst>
-        <pc:spChg chg="mod">
-          <ac:chgData name="Gerth Stølting Brodal" userId="04ef4784-6591-4f86-a140-f5c3b108582a" providerId="ADAL" clId="{A438EBA1-DB7D-4DC5-9143-438EE3137945}" dt="2024-02-19T06:58:16.887" v="134" actId="114"/>
-          <ac:spMkLst>
-            <pc:docMk/>
-            <pc:sldMk cId="100858788" sldId="568"/>
-            <ac:spMk id="3" creationId="{00000000-0000-0000-0000-000000000000}"/>
-          </ac:spMkLst>
-        </pc:spChg>
-        <pc:graphicFrameChg chg="modGraphic">
-          <ac:chgData name="Gerth Stølting Brodal" userId="04ef4784-6591-4f86-a140-f5c3b108582a" providerId="ADAL" clId="{A438EBA1-DB7D-4DC5-9143-438EE3137945}" dt="2024-02-19T06:49:18.502" v="31" actId="313"/>
-          <ac:graphicFrameMkLst>
-            <pc:docMk/>
-            <pc:sldMk cId="100858788" sldId="568"/>
-            <ac:graphicFrameMk id="6" creationId="{00000000-0000-0000-0000-000000000000}"/>
-          </ac:graphicFrameMkLst>
-        </pc:graphicFrameChg>
       </pc:sldChg>
       <pc:sldChg chg="modSp mod">
         <pc:chgData name="Gerth Stølting Brodal" userId="04ef4784-6591-4f86-a140-f5c3b108582a" providerId="ADAL" clId="{A438EBA1-DB7D-4DC5-9143-438EE3137945}" dt="2024-02-19T06:50:19.795" v="65" actId="313"/>
@@ -613,14 +317,6 @@
           <pc:docMk/>
           <pc:sldMk cId="1619579666" sldId="574"/>
         </pc:sldMkLst>
-        <pc:graphicFrameChg chg="modGraphic">
-          <ac:chgData name="Gerth Stølting Brodal" userId="04ef4784-6591-4f86-a140-f5c3b108582a" providerId="ADAL" clId="{A438EBA1-DB7D-4DC5-9143-438EE3137945}" dt="2024-02-19T06:50:19.795" v="65" actId="313"/>
-          <ac:graphicFrameMkLst>
-            <pc:docMk/>
-            <pc:sldMk cId="1619579666" sldId="574"/>
-            <ac:graphicFrameMk id="4" creationId="{00000000-0000-0000-0000-000000000000}"/>
-          </ac:graphicFrameMkLst>
-        </pc:graphicFrameChg>
       </pc:sldChg>
       <pc:sldChg chg="modSp mod modNotesTx">
         <pc:chgData name="Gerth Stølting Brodal" userId="04ef4784-6591-4f86-a140-f5c3b108582a" providerId="ADAL" clId="{A438EBA1-DB7D-4DC5-9143-438EE3137945}" dt="2024-02-21T08:20:04.961" v="573" actId="20577"/>
@@ -628,14 +324,6 @@
           <pc:docMk/>
           <pc:sldMk cId="2854255146" sldId="575"/>
         </pc:sldMkLst>
-        <pc:graphicFrameChg chg="modGraphic">
-          <ac:chgData name="Gerth Stølting Brodal" userId="04ef4784-6591-4f86-a140-f5c3b108582a" providerId="ADAL" clId="{A438EBA1-DB7D-4DC5-9143-438EE3137945}" dt="2024-02-19T07:17:50.360" v="269" actId="207"/>
-          <ac:graphicFrameMkLst>
-            <pc:docMk/>
-            <pc:sldMk cId="2854255146" sldId="575"/>
-            <ac:graphicFrameMk id="4" creationId="{00000000-0000-0000-0000-000000000000}"/>
-          </ac:graphicFrameMkLst>
-        </pc:graphicFrameChg>
       </pc:sldChg>
       <pc:sldChg chg="modSp mod">
         <pc:chgData name="Gerth Stølting Brodal" userId="04ef4784-6591-4f86-a140-f5c3b108582a" providerId="ADAL" clId="{A438EBA1-DB7D-4DC5-9143-438EE3137945}" dt="2024-02-19T06:50:14.150" v="57" actId="313"/>
@@ -643,30 +331,6 @@
           <pc:docMk/>
           <pc:sldMk cId="826728691" sldId="578"/>
         </pc:sldMkLst>
-        <pc:graphicFrameChg chg="modGraphic">
-          <ac:chgData name="Gerth Stølting Brodal" userId="04ef4784-6591-4f86-a140-f5c3b108582a" providerId="ADAL" clId="{A438EBA1-DB7D-4DC5-9143-438EE3137945}" dt="2024-02-19T06:49:53.433" v="45" actId="313"/>
-          <ac:graphicFrameMkLst>
-            <pc:docMk/>
-            <pc:sldMk cId="826728691" sldId="578"/>
-            <ac:graphicFrameMk id="7" creationId="{00000000-0000-0000-0000-000000000000}"/>
-          </ac:graphicFrameMkLst>
-        </pc:graphicFrameChg>
-        <pc:graphicFrameChg chg="modGraphic">
-          <ac:chgData name="Gerth Stølting Brodal" userId="04ef4784-6591-4f86-a140-f5c3b108582a" providerId="ADAL" clId="{A438EBA1-DB7D-4DC5-9143-438EE3137945}" dt="2024-02-19T06:50:11.240" v="51" actId="313"/>
-          <ac:graphicFrameMkLst>
-            <pc:docMk/>
-            <pc:sldMk cId="826728691" sldId="578"/>
-            <ac:graphicFrameMk id="8" creationId="{00000000-0000-0000-0000-000000000000}"/>
-          </ac:graphicFrameMkLst>
-        </pc:graphicFrameChg>
-        <pc:graphicFrameChg chg="modGraphic">
-          <ac:chgData name="Gerth Stølting Brodal" userId="04ef4784-6591-4f86-a140-f5c3b108582a" providerId="ADAL" clId="{A438EBA1-DB7D-4DC5-9143-438EE3137945}" dt="2024-02-19T06:50:14.150" v="57" actId="313"/>
-          <ac:graphicFrameMkLst>
-            <pc:docMk/>
-            <pc:sldMk cId="826728691" sldId="578"/>
-            <ac:graphicFrameMk id="9" creationId="{00000000-0000-0000-0000-000000000000}"/>
-          </ac:graphicFrameMkLst>
-        </pc:graphicFrameChg>
       </pc:sldChg>
       <pc:sldChg chg="modSp mod">
         <pc:chgData name="Gerth Stølting Brodal" userId="04ef4784-6591-4f86-a140-f5c3b108582a" providerId="ADAL" clId="{A438EBA1-DB7D-4DC5-9143-438EE3137945}" dt="2024-02-19T06:50:24.770" v="69" actId="313"/>
@@ -674,14 +338,6 @@
           <pc:docMk/>
           <pc:sldMk cId="4009993959" sldId="582"/>
         </pc:sldMkLst>
-        <pc:graphicFrameChg chg="modGraphic">
-          <ac:chgData name="Gerth Stølting Brodal" userId="04ef4784-6591-4f86-a140-f5c3b108582a" providerId="ADAL" clId="{A438EBA1-DB7D-4DC5-9143-438EE3137945}" dt="2024-02-19T06:50:24.770" v="69" actId="313"/>
-          <ac:graphicFrameMkLst>
-            <pc:docMk/>
-            <pc:sldMk cId="4009993959" sldId="582"/>
-            <ac:graphicFrameMk id="4" creationId="{00000000-0000-0000-0000-000000000000}"/>
-          </ac:graphicFrameMkLst>
-        </pc:graphicFrameChg>
       </pc:sldChg>
       <pc:sldChg chg="modSp mod modNotesTx">
         <pc:chgData name="Gerth Stølting Brodal" userId="04ef4784-6591-4f86-a140-f5c3b108582a" providerId="ADAL" clId="{A438EBA1-DB7D-4DC5-9143-438EE3137945}" dt="2024-02-19T07:27:35.531" v="452" actId="20577"/>
@@ -689,14 +345,6 @@
           <pc:docMk/>
           <pc:sldMk cId="2874315793" sldId="587"/>
         </pc:sldMkLst>
-        <pc:graphicFrameChg chg="modGraphic">
-          <ac:chgData name="Gerth Stølting Brodal" userId="04ef4784-6591-4f86-a140-f5c3b108582a" providerId="ADAL" clId="{A438EBA1-DB7D-4DC5-9143-438EE3137945}" dt="2024-02-19T06:50:47.786" v="85" actId="313"/>
-          <ac:graphicFrameMkLst>
-            <pc:docMk/>
-            <pc:sldMk cId="2874315793" sldId="587"/>
-            <ac:graphicFrameMk id="4" creationId="{00000000-0000-0000-0000-000000000000}"/>
-          </ac:graphicFrameMkLst>
-        </pc:graphicFrameChg>
       </pc:sldChg>
       <pc:sldChg chg="modSp mod modNotesTx">
         <pc:chgData name="Gerth Stølting Brodal" userId="04ef4784-6591-4f86-a140-f5c3b108582a" providerId="ADAL" clId="{A438EBA1-DB7D-4DC5-9143-438EE3137945}" dt="2024-02-21T08:27:44.993" v="590" actId="20577"/>
@@ -704,14 +352,6 @@
           <pc:docMk/>
           <pc:sldMk cId="1007572461" sldId="588"/>
         </pc:sldMkLst>
-        <pc:graphicFrameChg chg="modGraphic">
-          <ac:chgData name="Gerth Stølting Brodal" userId="04ef4784-6591-4f86-a140-f5c3b108582a" providerId="ADAL" clId="{A438EBA1-DB7D-4DC5-9143-438EE3137945}" dt="2024-02-19T06:50:32.840" v="83" actId="313"/>
-          <ac:graphicFrameMkLst>
-            <pc:docMk/>
-            <pc:sldMk cId="1007572461" sldId="588"/>
-            <ac:graphicFrameMk id="4" creationId="{00000000-0000-0000-0000-000000000000}"/>
-          </ac:graphicFrameMkLst>
-        </pc:graphicFrameChg>
       </pc:sldChg>
       <pc:sldChg chg="modNotesTx">
         <pc:chgData name="Gerth Stølting Brodal" userId="04ef4784-6591-4f86-a140-f5c3b108582a" providerId="ADAL" clId="{A438EBA1-DB7D-4DC5-9143-438EE3137945}" dt="2024-02-21T08:39:08.710" v="607" actId="20577"/>
@@ -742,22 +382,6 @@
           <pc:docMk/>
           <pc:sldMk cId="3628447800" sldId="561"/>
         </pc:sldMkLst>
-        <pc:spChg chg="mod">
-          <ac:chgData name="Gerth Stølting Brodal" userId="04ef4784-6591-4f86-a140-f5c3b108582a" providerId="ADAL" clId="{89EC5210-EF5D-482B-9301-5C971FABFA3E}" dt="2023-02-18T10:43:43.554" v="1027" actId="20577"/>
-          <ac:spMkLst>
-            <pc:docMk/>
-            <pc:sldMk cId="3628447800" sldId="561"/>
-            <ac:spMk id="3" creationId="{00000000-0000-0000-0000-000000000000}"/>
-          </ac:spMkLst>
-        </pc:spChg>
-        <pc:graphicFrameChg chg="modGraphic">
-          <ac:chgData name="Gerth Stølting Brodal" userId="04ef4784-6591-4f86-a140-f5c3b108582a" providerId="ADAL" clId="{89EC5210-EF5D-482B-9301-5C971FABFA3E}" dt="2023-02-18T08:04:18.900" v="3" actId="20577"/>
-          <ac:graphicFrameMkLst>
-            <pc:docMk/>
-            <pc:sldMk cId="3628447800" sldId="561"/>
-            <ac:graphicFrameMk id="4" creationId="{00000000-0000-0000-0000-000000000000}"/>
-          </ac:graphicFrameMkLst>
-        </pc:graphicFrameChg>
       </pc:sldChg>
       <pc:sldChg chg="modSp mod">
         <pc:chgData name="Gerth Stølting Brodal" userId="04ef4784-6591-4f86-a140-f5c3b108582a" providerId="ADAL" clId="{89EC5210-EF5D-482B-9301-5C971FABFA3E}" dt="2023-02-19T18:31:55.092" v="1214"/>
@@ -765,14 +389,6 @@
           <pc:docMk/>
           <pc:sldMk cId="3419193662" sldId="565"/>
         </pc:sldMkLst>
-        <pc:graphicFrameChg chg="mod modGraphic">
-          <ac:chgData name="Gerth Stølting Brodal" userId="04ef4784-6591-4f86-a140-f5c3b108582a" providerId="ADAL" clId="{89EC5210-EF5D-482B-9301-5C971FABFA3E}" dt="2023-02-19T18:31:55.092" v="1214"/>
-          <ac:graphicFrameMkLst>
-            <pc:docMk/>
-            <pc:sldMk cId="3419193662" sldId="565"/>
-            <ac:graphicFrameMk id="4" creationId="{00000000-0000-0000-0000-000000000000}"/>
-          </ac:graphicFrameMkLst>
-        </pc:graphicFrameChg>
       </pc:sldChg>
       <pc:sldChg chg="modSp mod">
         <pc:chgData name="Gerth Stølting Brodal" userId="04ef4784-6591-4f86-a140-f5c3b108582a" providerId="ADAL" clId="{89EC5210-EF5D-482B-9301-5C971FABFA3E}" dt="2023-02-19T18:35:09.228" v="1216" actId="207"/>
@@ -780,14 +396,6 @@
           <pc:docMk/>
           <pc:sldMk cId="3627704936" sldId="566"/>
         </pc:sldMkLst>
-        <pc:spChg chg="mod">
-          <ac:chgData name="Gerth Stølting Brodal" userId="04ef4784-6591-4f86-a140-f5c3b108582a" providerId="ADAL" clId="{89EC5210-EF5D-482B-9301-5C971FABFA3E}" dt="2023-02-19T18:35:09.228" v="1216" actId="207"/>
-          <ac:spMkLst>
-            <pc:docMk/>
-            <pc:sldMk cId="3627704936" sldId="566"/>
-            <ac:spMk id="3" creationId="{00000000-0000-0000-0000-000000000000}"/>
-          </ac:spMkLst>
-        </pc:spChg>
       </pc:sldChg>
       <pc:sldChg chg="modSp mod">
         <pc:chgData name="Gerth Stølting Brodal" userId="04ef4784-6591-4f86-a140-f5c3b108582a" providerId="ADAL" clId="{89EC5210-EF5D-482B-9301-5C971FABFA3E}" dt="2023-02-19T18:38:43.530" v="1265" actId="1076"/>
@@ -795,22 +403,6 @@
           <pc:docMk/>
           <pc:sldMk cId="2099313752" sldId="567"/>
         </pc:sldMkLst>
-        <pc:spChg chg="mod">
-          <ac:chgData name="Gerth Stølting Brodal" userId="04ef4784-6591-4f86-a140-f5c3b108582a" providerId="ADAL" clId="{89EC5210-EF5D-482B-9301-5C971FABFA3E}" dt="2023-02-18T08:42:02.465" v="183" actId="20577"/>
-          <ac:spMkLst>
-            <pc:docMk/>
-            <pc:sldMk cId="2099313752" sldId="567"/>
-            <ac:spMk id="3" creationId="{00000000-0000-0000-0000-000000000000}"/>
-          </ac:spMkLst>
-        </pc:spChg>
-        <pc:graphicFrameChg chg="mod modGraphic">
-          <ac:chgData name="Gerth Stølting Brodal" userId="04ef4784-6591-4f86-a140-f5c3b108582a" providerId="ADAL" clId="{89EC5210-EF5D-482B-9301-5C971FABFA3E}" dt="2023-02-19T18:38:43.530" v="1265" actId="1076"/>
-          <ac:graphicFrameMkLst>
-            <pc:docMk/>
-            <pc:sldMk cId="2099313752" sldId="567"/>
-            <ac:graphicFrameMk id="5" creationId="{00000000-0000-0000-0000-000000000000}"/>
-          </ac:graphicFrameMkLst>
-        </pc:graphicFrameChg>
       </pc:sldChg>
       <pc:sldChg chg="modSp mod">
         <pc:chgData name="Gerth Stølting Brodal" userId="04ef4784-6591-4f86-a140-f5c3b108582a" providerId="ADAL" clId="{89EC5210-EF5D-482B-9301-5C971FABFA3E}" dt="2023-02-18T10:44:22.250" v="1029" actId="20577"/>
@@ -818,14 +410,6 @@
           <pc:docMk/>
           <pc:sldMk cId="100858788" sldId="568"/>
         </pc:sldMkLst>
-        <pc:spChg chg="mod">
-          <ac:chgData name="Gerth Stølting Brodal" userId="04ef4784-6591-4f86-a140-f5c3b108582a" providerId="ADAL" clId="{89EC5210-EF5D-482B-9301-5C971FABFA3E}" dt="2023-02-18T10:44:22.250" v="1029" actId="20577"/>
-          <ac:spMkLst>
-            <pc:docMk/>
-            <pc:sldMk cId="100858788" sldId="568"/>
-            <ac:spMk id="3" creationId="{00000000-0000-0000-0000-000000000000}"/>
-          </ac:spMkLst>
-        </pc:spChg>
       </pc:sldChg>
       <pc:sldChg chg="modSp mod modNotesTx">
         <pc:chgData name="Gerth Stølting Brodal" userId="04ef4784-6591-4f86-a140-f5c3b108582a" providerId="ADAL" clId="{89EC5210-EF5D-482B-9301-5C971FABFA3E}" dt="2023-02-22T12:23:42.801" v="1766" actId="20577"/>
@@ -833,190 +417,6 @@
           <pc:docMk/>
           <pc:sldMk cId="4291965801" sldId="571"/>
         </pc:sldMkLst>
-        <pc:spChg chg="mod">
-          <ac:chgData name="Gerth Stølting Brodal" userId="04ef4784-6591-4f86-a140-f5c3b108582a" providerId="ADAL" clId="{89EC5210-EF5D-482B-9301-5C971FABFA3E}" dt="2023-02-18T09:43:16.124" v="205" actId="1076"/>
-          <ac:spMkLst>
-            <pc:docMk/>
-            <pc:sldMk cId="4291965801" sldId="571"/>
-            <ac:spMk id="6" creationId="{00000000-0000-0000-0000-000000000000}"/>
-          </ac:spMkLst>
-        </pc:spChg>
-        <pc:spChg chg="mod">
-          <ac:chgData name="Gerth Stølting Brodal" userId="04ef4784-6591-4f86-a140-f5c3b108582a" providerId="ADAL" clId="{89EC5210-EF5D-482B-9301-5C971FABFA3E}" dt="2023-02-18T09:43:16.124" v="205" actId="1076"/>
-          <ac:spMkLst>
-            <pc:docMk/>
-            <pc:sldMk cId="4291965801" sldId="571"/>
-            <ac:spMk id="7" creationId="{00000000-0000-0000-0000-000000000000}"/>
-          </ac:spMkLst>
-        </pc:spChg>
-        <pc:spChg chg="mod">
-          <ac:chgData name="Gerth Stølting Brodal" userId="04ef4784-6591-4f86-a140-f5c3b108582a" providerId="ADAL" clId="{89EC5210-EF5D-482B-9301-5C971FABFA3E}" dt="2023-02-18T09:43:16.124" v="205" actId="1076"/>
-          <ac:spMkLst>
-            <pc:docMk/>
-            <pc:sldMk cId="4291965801" sldId="571"/>
-            <ac:spMk id="8" creationId="{00000000-0000-0000-0000-000000000000}"/>
-          </ac:spMkLst>
-        </pc:spChg>
-        <pc:spChg chg="mod">
-          <ac:chgData name="Gerth Stølting Brodal" userId="04ef4784-6591-4f86-a140-f5c3b108582a" providerId="ADAL" clId="{89EC5210-EF5D-482B-9301-5C971FABFA3E}" dt="2023-02-18T09:43:16.124" v="205" actId="1076"/>
-          <ac:spMkLst>
-            <pc:docMk/>
-            <pc:sldMk cId="4291965801" sldId="571"/>
-            <ac:spMk id="9" creationId="{00000000-0000-0000-0000-000000000000}"/>
-          </ac:spMkLst>
-        </pc:spChg>
-        <pc:spChg chg="mod">
-          <ac:chgData name="Gerth Stølting Brodal" userId="04ef4784-6591-4f86-a140-f5c3b108582a" providerId="ADAL" clId="{89EC5210-EF5D-482B-9301-5C971FABFA3E}" dt="2023-02-18T09:43:22.806" v="206" actId="1076"/>
-          <ac:spMkLst>
-            <pc:docMk/>
-            <pc:sldMk cId="4291965801" sldId="571"/>
-            <ac:spMk id="10" creationId="{00000000-0000-0000-0000-000000000000}"/>
-          </ac:spMkLst>
-        </pc:spChg>
-        <pc:spChg chg="mod">
-          <ac:chgData name="Gerth Stølting Brodal" userId="04ef4784-6591-4f86-a140-f5c3b108582a" providerId="ADAL" clId="{89EC5210-EF5D-482B-9301-5C971FABFA3E}" dt="2023-02-18T09:43:22.806" v="206" actId="1076"/>
-          <ac:spMkLst>
-            <pc:docMk/>
-            <pc:sldMk cId="4291965801" sldId="571"/>
-            <ac:spMk id="11" creationId="{00000000-0000-0000-0000-000000000000}"/>
-          </ac:spMkLst>
-        </pc:spChg>
-        <pc:spChg chg="mod">
-          <ac:chgData name="Gerth Stølting Brodal" userId="04ef4784-6591-4f86-a140-f5c3b108582a" providerId="ADAL" clId="{89EC5210-EF5D-482B-9301-5C971FABFA3E}" dt="2023-02-18T09:43:22.806" v="206" actId="1076"/>
-          <ac:spMkLst>
-            <pc:docMk/>
-            <pc:sldMk cId="4291965801" sldId="571"/>
-            <ac:spMk id="12" creationId="{00000000-0000-0000-0000-000000000000}"/>
-          </ac:spMkLst>
-        </pc:spChg>
-        <pc:spChg chg="mod">
-          <ac:chgData name="Gerth Stølting Brodal" userId="04ef4784-6591-4f86-a140-f5c3b108582a" providerId="ADAL" clId="{89EC5210-EF5D-482B-9301-5C971FABFA3E}" dt="2023-02-18T09:43:22.806" v="206" actId="1076"/>
-          <ac:spMkLst>
-            <pc:docMk/>
-            <pc:sldMk cId="4291965801" sldId="571"/>
-            <ac:spMk id="13" creationId="{00000000-0000-0000-0000-000000000000}"/>
-          </ac:spMkLst>
-        </pc:spChg>
-        <pc:spChg chg="mod">
-          <ac:chgData name="Gerth Stølting Brodal" userId="04ef4784-6591-4f86-a140-f5c3b108582a" providerId="ADAL" clId="{89EC5210-EF5D-482B-9301-5C971FABFA3E}" dt="2023-02-18T09:43:22.806" v="206" actId="1076"/>
-          <ac:spMkLst>
-            <pc:docMk/>
-            <pc:sldMk cId="4291965801" sldId="571"/>
-            <ac:spMk id="14" creationId="{00000000-0000-0000-0000-000000000000}"/>
-          </ac:spMkLst>
-        </pc:spChg>
-        <pc:spChg chg="mod">
-          <ac:chgData name="Gerth Stølting Brodal" userId="04ef4784-6591-4f86-a140-f5c3b108582a" providerId="ADAL" clId="{89EC5210-EF5D-482B-9301-5C971FABFA3E}" dt="2023-02-18T09:43:22.806" v="206" actId="1076"/>
-          <ac:spMkLst>
-            <pc:docMk/>
-            <pc:sldMk cId="4291965801" sldId="571"/>
-            <ac:spMk id="15" creationId="{00000000-0000-0000-0000-000000000000}"/>
-          </ac:spMkLst>
-        </pc:spChg>
-        <pc:spChg chg="mod">
-          <ac:chgData name="Gerth Stølting Brodal" userId="04ef4784-6591-4f86-a140-f5c3b108582a" providerId="ADAL" clId="{89EC5210-EF5D-482B-9301-5C971FABFA3E}" dt="2023-02-18T09:43:22.806" v="206" actId="1076"/>
-          <ac:spMkLst>
-            <pc:docMk/>
-            <pc:sldMk cId="4291965801" sldId="571"/>
-            <ac:spMk id="16" creationId="{00000000-0000-0000-0000-000000000000}"/>
-          </ac:spMkLst>
-        </pc:spChg>
-        <pc:spChg chg="mod">
-          <ac:chgData name="Gerth Stølting Brodal" userId="04ef4784-6591-4f86-a140-f5c3b108582a" providerId="ADAL" clId="{89EC5210-EF5D-482B-9301-5C971FABFA3E}" dt="2023-02-18T09:43:22.806" v="206" actId="1076"/>
-          <ac:spMkLst>
-            <pc:docMk/>
-            <pc:sldMk cId="4291965801" sldId="571"/>
-            <ac:spMk id="17" creationId="{00000000-0000-0000-0000-000000000000}"/>
-          </ac:spMkLst>
-        </pc:spChg>
-        <pc:spChg chg="mod">
-          <ac:chgData name="Gerth Stølting Brodal" userId="04ef4784-6591-4f86-a140-f5c3b108582a" providerId="ADAL" clId="{89EC5210-EF5D-482B-9301-5C971FABFA3E}" dt="2023-02-18T09:43:22.806" v="206" actId="1076"/>
-          <ac:spMkLst>
-            <pc:docMk/>
-            <pc:sldMk cId="4291965801" sldId="571"/>
-            <ac:spMk id="18" creationId="{00000000-0000-0000-0000-000000000000}"/>
-          </ac:spMkLst>
-        </pc:spChg>
-        <pc:spChg chg="mod">
-          <ac:chgData name="Gerth Stølting Brodal" userId="04ef4784-6591-4f86-a140-f5c3b108582a" providerId="ADAL" clId="{89EC5210-EF5D-482B-9301-5C971FABFA3E}" dt="2023-02-18T09:43:22.806" v="206" actId="1076"/>
-          <ac:spMkLst>
-            <pc:docMk/>
-            <pc:sldMk cId="4291965801" sldId="571"/>
-            <ac:spMk id="19" creationId="{00000000-0000-0000-0000-000000000000}"/>
-          </ac:spMkLst>
-        </pc:spChg>
-        <pc:spChg chg="mod">
-          <ac:chgData name="Gerth Stølting Brodal" userId="04ef4784-6591-4f86-a140-f5c3b108582a" providerId="ADAL" clId="{89EC5210-EF5D-482B-9301-5C971FABFA3E}" dt="2023-02-18T09:43:22.806" v="206" actId="1076"/>
-          <ac:spMkLst>
-            <pc:docMk/>
-            <pc:sldMk cId="4291965801" sldId="571"/>
-            <ac:spMk id="20" creationId="{00000000-0000-0000-0000-000000000000}"/>
-          </ac:spMkLst>
-        </pc:spChg>
-        <pc:spChg chg="mod">
-          <ac:chgData name="Gerth Stølting Brodal" userId="04ef4784-6591-4f86-a140-f5c3b108582a" providerId="ADAL" clId="{89EC5210-EF5D-482B-9301-5C971FABFA3E}" dt="2023-02-18T09:43:22.806" v="206" actId="1076"/>
-          <ac:spMkLst>
-            <pc:docMk/>
-            <pc:sldMk cId="4291965801" sldId="571"/>
-            <ac:spMk id="21" creationId="{00000000-0000-0000-0000-000000000000}"/>
-          </ac:spMkLst>
-        </pc:spChg>
-        <pc:spChg chg="mod">
-          <ac:chgData name="Gerth Stølting Brodal" userId="04ef4784-6591-4f86-a140-f5c3b108582a" providerId="ADAL" clId="{89EC5210-EF5D-482B-9301-5C971FABFA3E}" dt="2023-02-18T09:43:22.806" v="206" actId="1076"/>
-          <ac:spMkLst>
-            <pc:docMk/>
-            <pc:sldMk cId="4291965801" sldId="571"/>
-            <ac:spMk id="24" creationId="{00000000-0000-0000-0000-000000000000}"/>
-          </ac:spMkLst>
-        </pc:spChg>
-        <pc:spChg chg="mod">
-          <ac:chgData name="Gerth Stølting Brodal" userId="04ef4784-6591-4f86-a140-f5c3b108582a" providerId="ADAL" clId="{89EC5210-EF5D-482B-9301-5C971FABFA3E}" dt="2023-02-18T09:43:22.806" v="206" actId="1076"/>
-          <ac:spMkLst>
-            <pc:docMk/>
-            <pc:sldMk cId="4291965801" sldId="571"/>
-            <ac:spMk id="25" creationId="{00000000-0000-0000-0000-000000000000}"/>
-          </ac:spMkLst>
-        </pc:spChg>
-        <pc:spChg chg="mod">
-          <ac:chgData name="Gerth Stølting Brodal" userId="04ef4784-6591-4f86-a140-f5c3b108582a" providerId="ADAL" clId="{89EC5210-EF5D-482B-9301-5C971FABFA3E}" dt="2023-02-18T09:43:22.806" v="206" actId="1076"/>
-          <ac:spMkLst>
-            <pc:docMk/>
-            <pc:sldMk cId="4291965801" sldId="571"/>
-            <ac:spMk id="27" creationId="{00000000-0000-0000-0000-000000000000}"/>
-          </ac:spMkLst>
-        </pc:spChg>
-        <pc:spChg chg="mod">
-          <ac:chgData name="Gerth Stølting Brodal" userId="04ef4784-6591-4f86-a140-f5c3b108582a" providerId="ADAL" clId="{89EC5210-EF5D-482B-9301-5C971FABFA3E}" dt="2023-02-18T09:43:22.806" v="206" actId="1076"/>
-          <ac:spMkLst>
-            <pc:docMk/>
-            <pc:sldMk cId="4291965801" sldId="571"/>
-            <ac:spMk id="28" creationId="{00000000-0000-0000-0000-000000000000}"/>
-          </ac:spMkLst>
-        </pc:spChg>
-        <pc:graphicFrameChg chg="mod modGraphic">
-          <ac:chgData name="Gerth Stølting Brodal" userId="04ef4784-6591-4f86-a140-f5c3b108582a" providerId="ADAL" clId="{89EC5210-EF5D-482B-9301-5C971FABFA3E}" dt="2023-02-18T09:43:16.124" v="205" actId="1076"/>
-          <ac:graphicFrameMkLst>
-            <pc:docMk/>
-            <pc:sldMk cId="4291965801" sldId="571"/>
-            <ac:graphicFrameMk id="4" creationId="{00000000-0000-0000-0000-000000000000}"/>
-          </ac:graphicFrameMkLst>
-        </pc:graphicFrameChg>
-        <pc:graphicFrameChg chg="mod">
-          <ac:chgData name="Gerth Stølting Brodal" userId="04ef4784-6591-4f86-a140-f5c3b108582a" providerId="ADAL" clId="{89EC5210-EF5D-482B-9301-5C971FABFA3E}" dt="2023-02-18T09:43:22.806" v="206" actId="1076"/>
-          <ac:graphicFrameMkLst>
-            <pc:docMk/>
-            <pc:sldMk cId="4291965801" sldId="571"/>
-            <ac:graphicFrameMk id="5" creationId="{00000000-0000-0000-0000-000000000000}"/>
-          </ac:graphicFrameMkLst>
-        </pc:graphicFrameChg>
-        <pc:cxnChg chg="mod">
-          <ac:chgData name="Gerth Stølting Brodal" userId="04ef4784-6591-4f86-a140-f5c3b108582a" providerId="ADAL" clId="{89EC5210-EF5D-482B-9301-5C971FABFA3E}" dt="2023-02-18T09:43:22.806" v="206" actId="1076"/>
-          <ac:cxnSpMkLst>
-            <pc:docMk/>
-            <pc:sldMk cId="4291965801" sldId="571"/>
-            <ac:cxnSpMk id="23" creationId="{00000000-0000-0000-0000-000000000000}"/>
-          </ac:cxnSpMkLst>
-        </pc:cxnChg>
       </pc:sldChg>
       <pc:sldChg chg="modNotesTx">
         <pc:chgData name="Gerth Stølting Brodal" userId="04ef4784-6591-4f86-a140-f5c3b108582a" providerId="ADAL" clId="{89EC5210-EF5D-482B-9301-5C971FABFA3E}" dt="2023-02-18T08:20:47.793" v="20" actId="20577"/>
@@ -1038,14 +438,6 @@
           <pc:docMk/>
           <pc:sldMk cId="1619579666" sldId="574"/>
         </pc:sldMkLst>
-        <pc:spChg chg="mod">
-          <ac:chgData name="Gerth Stølting Brodal" userId="04ef4784-6591-4f86-a140-f5c3b108582a" providerId="ADAL" clId="{89EC5210-EF5D-482B-9301-5C971FABFA3E}" dt="2023-02-18T08:37:20.565" v="114" actId="20577"/>
-          <ac:spMkLst>
-            <pc:docMk/>
-            <pc:sldMk cId="1619579666" sldId="574"/>
-            <ac:spMk id="3" creationId="{00000000-0000-0000-0000-000000000000}"/>
-          </ac:spMkLst>
-        </pc:spChg>
       </pc:sldChg>
       <pc:sldChg chg="modSp mod modNotesTx">
         <pc:chgData name="Gerth Stølting Brodal" userId="04ef4784-6591-4f86-a140-f5c3b108582a" providerId="ADAL" clId="{89EC5210-EF5D-482B-9301-5C971FABFA3E}" dt="2023-02-22T12:17:11.118" v="1730" actId="20577"/>
@@ -1053,14 +445,6 @@
           <pc:docMk/>
           <pc:sldMk cId="2854255146" sldId="575"/>
         </pc:sldMkLst>
-        <pc:graphicFrameChg chg="mod modGraphic">
-          <ac:chgData name="Gerth Stølting Brodal" userId="04ef4784-6591-4f86-a140-f5c3b108582a" providerId="ADAL" clId="{89EC5210-EF5D-482B-9301-5C971FABFA3E}" dt="2023-02-19T18:40:28.609" v="1284" actId="1076"/>
-          <ac:graphicFrameMkLst>
-            <pc:docMk/>
-            <pc:sldMk cId="2854255146" sldId="575"/>
-            <ac:graphicFrameMk id="4" creationId="{00000000-0000-0000-0000-000000000000}"/>
-          </ac:graphicFrameMkLst>
-        </pc:graphicFrameChg>
       </pc:sldChg>
       <pc:sldChg chg="modSp mod">
         <pc:chgData name="Gerth Stølting Brodal" userId="04ef4784-6591-4f86-a140-f5c3b108582a" providerId="ADAL" clId="{89EC5210-EF5D-482B-9301-5C971FABFA3E}" dt="2023-02-22T12:37:41.659" v="1849" actId="27636"/>
@@ -1068,14 +452,6 @@
           <pc:docMk/>
           <pc:sldMk cId="3579293872" sldId="577"/>
         </pc:sldMkLst>
-        <pc:spChg chg="mod">
-          <ac:chgData name="Gerth Stølting Brodal" userId="04ef4784-6591-4f86-a140-f5c3b108582a" providerId="ADAL" clId="{89EC5210-EF5D-482B-9301-5C971FABFA3E}" dt="2023-02-22T12:37:41.659" v="1849" actId="27636"/>
-          <ac:spMkLst>
-            <pc:docMk/>
-            <pc:sldMk cId="3579293872" sldId="577"/>
-            <ac:spMk id="3" creationId="{00000000-0000-0000-0000-000000000000}"/>
-          </ac:spMkLst>
-        </pc:spChg>
       </pc:sldChg>
       <pc:sldChg chg="modSp mod">
         <pc:chgData name="Gerth Stølting Brodal" userId="04ef4784-6591-4f86-a140-f5c3b108582a" providerId="ADAL" clId="{89EC5210-EF5D-482B-9301-5C971FABFA3E}" dt="2023-02-19T18:46:39.801" v="1399" actId="1076"/>
@@ -1083,22 +459,6 @@
           <pc:docMk/>
           <pc:sldMk cId="4009993959" sldId="582"/>
         </pc:sldMkLst>
-        <pc:spChg chg="mod">
-          <ac:chgData name="Gerth Stølting Brodal" userId="04ef4784-6591-4f86-a140-f5c3b108582a" providerId="ADAL" clId="{89EC5210-EF5D-482B-9301-5C971FABFA3E}" dt="2023-02-19T18:46:39.801" v="1399" actId="1076"/>
-          <ac:spMkLst>
-            <pc:docMk/>
-            <pc:sldMk cId="4009993959" sldId="582"/>
-            <ac:spMk id="3" creationId="{00000000-0000-0000-0000-000000000000}"/>
-          </ac:spMkLst>
-        </pc:spChg>
-        <pc:graphicFrameChg chg="mod modGraphic">
-          <ac:chgData name="Gerth Stølting Brodal" userId="04ef4784-6591-4f86-a140-f5c3b108582a" providerId="ADAL" clId="{89EC5210-EF5D-482B-9301-5C971FABFA3E}" dt="2023-02-19T18:46:25.649" v="1398" actId="1076"/>
-          <ac:graphicFrameMkLst>
-            <pc:docMk/>
-            <pc:sldMk cId="4009993959" sldId="582"/>
-            <ac:graphicFrameMk id="4" creationId="{00000000-0000-0000-0000-000000000000}"/>
-          </ac:graphicFrameMkLst>
-        </pc:graphicFrameChg>
       </pc:sldChg>
       <pc:sldChg chg="modSp mod modNotesTx">
         <pc:chgData name="Gerth Stølting Brodal" userId="04ef4784-6591-4f86-a140-f5c3b108582a" providerId="ADAL" clId="{89EC5210-EF5D-482B-9301-5C971FABFA3E}" dt="2023-02-18T10:52:08.355" v="1148" actId="1035"/>
@@ -1106,22 +466,6 @@
           <pc:docMk/>
           <pc:sldMk cId="1896777206" sldId="585"/>
         </pc:sldMkLst>
-        <pc:spChg chg="mod">
-          <ac:chgData name="Gerth Stølting Brodal" userId="04ef4784-6591-4f86-a140-f5c3b108582a" providerId="ADAL" clId="{89EC5210-EF5D-482B-9301-5C971FABFA3E}" dt="2023-02-18T10:52:08.355" v="1148" actId="1035"/>
-          <ac:spMkLst>
-            <pc:docMk/>
-            <pc:sldMk cId="1896777206" sldId="585"/>
-            <ac:spMk id="3" creationId="{00000000-0000-0000-0000-000000000000}"/>
-          </ac:spMkLst>
-        </pc:spChg>
-        <pc:graphicFrameChg chg="mod modGraphic">
-          <ac:chgData name="Gerth Stølting Brodal" userId="04ef4784-6591-4f86-a140-f5c3b108582a" providerId="ADAL" clId="{89EC5210-EF5D-482B-9301-5C971FABFA3E}" dt="2023-02-18T10:28:13.889" v="943" actId="1076"/>
-          <ac:graphicFrameMkLst>
-            <pc:docMk/>
-            <pc:sldMk cId="1896777206" sldId="585"/>
-            <ac:graphicFrameMk id="6" creationId="{00000000-0000-0000-0000-000000000000}"/>
-          </ac:graphicFrameMkLst>
-        </pc:graphicFrameChg>
       </pc:sldChg>
       <pc:sldChg chg="modSp mod modNotesTx">
         <pc:chgData name="Gerth Stølting Brodal" userId="04ef4784-6591-4f86-a140-f5c3b108582a" providerId="ADAL" clId="{89EC5210-EF5D-482B-9301-5C971FABFA3E}" dt="2023-02-22T12:28:01.782" v="1821" actId="20577"/>
@@ -1129,14 +473,6 @@
           <pc:docMk/>
           <pc:sldMk cId="653558519" sldId="586"/>
         </pc:sldMkLst>
-        <pc:graphicFrameChg chg="modGraphic">
-          <ac:chgData name="Gerth Stølting Brodal" userId="04ef4784-6591-4f86-a140-f5c3b108582a" providerId="ADAL" clId="{89EC5210-EF5D-482B-9301-5C971FABFA3E}" dt="2023-02-18T09:49:05.144" v="328" actId="20577"/>
-          <ac:graphicFrameMkLst>
-            <pc:docMk/>
-            <pc:sldMk cId="653558519" sldId="586"/>
-            <ac:graphicFrameMk id="4" creationId="{00000000-0000-0000-0000-000000000000}"/>
-          </ac:graphicFrameMkLst>
-        </pc:graphicFrameChg>
       </pc:sldChg>
       <pc:sldChg chg="modSp mod">
         <pc:chgData name="Gerth Stølting Brodal" userId="04ef4784-6591-4f86-a140-f5c3b108582a" providerId="ADAL" clId="{89EC5210-EF5D-482B-9301-5C971FABFA3E}" dt="2023-02-18T08:13:17.127" v="6" actId="20577"/>
@@ -1144,14 +480,6 @@
           <pc:docMk/>
           <pc:sldMk cId="4039368805" sldId="589"/>
         </pc:sldMkLst>
-        <pc:graphicFrameChg chg="modGraphic">
-          <ac:chgData name="Gerth Stølting Brodal" userId="04ef4784-6591-4f86-a140-f5c3b108582a" providerId="ADAL" clId="{89EC5210-EF5D-482B-9301-5C971FABFA3E}" dt="2023-02-18T08:13:17.127" v="6" actId="20577"/>
-          <ac:graphicFrameMkLst>
-            <pc:docMk/>
-            <pc:sldMk cId="4039368805" sldId="589"/>
-            <ac:graphicFrameMk id="4" creationId="{00000000-0000-0000-0000-000000000000}"/>
-          </ac:graphicFrameMkLst>
-        </pc:graphicFrameChg>
       </pc:sldChg>
       <pc:sldChg chg="modSp mod modNotesTx">
         <pc:chgData name="Gerth Stølting Brodal" userId="04ef4784-6591-4f86-a140-f5c3b108582a" providerId="ADAL" clId="{89EC5210-EF5D-482B-9301-5C971FABFA3E}" dt="2023-03-01T09:03:13.754" v="1856" actId="6549"/>
@@ -1159,14 +487,6 @@
           <pc:docMk/>
           <pc:sldMk cId="3860775354" sldId="590"/>
         </pc:sldMkLst>
-        <pc:spChg chg="mod">
-          <ac:chgData name="Gerth Stølting Brodal" userId="04ef4784-6591-4f86-a140-f5c3b108582a" providerId="ADAL" clId="{89EC5210-EF5D-482B-9301-5C971FABFA3E}" dt="2023-02-18T08:38:31.754" v="128" actId="20577"/>
-          <ac:spMkLst>
-            <pc:docMk/>
-            <pc:sldMk cId="3860775354" sldId="590"/>
-            <ac:spMk id="3" creationId="{833CE651-B63C-4186-9D3C-ECB731028B26}"/>
-          </ac:spMkLst>
-        </pc:spChg>
       </pc:sldChg>
       <pc:sldChg chg="addSp modSp add mod modNotesTx">
         <pc:chgData name="Gerth Stølting Brodal" userId="04ef4784-6591-4f86-a140-f5c3b108582a" providerId="ADAL" clId="{89EC5210-EF5D-482B-9301-5C971FABFA3E}" dt="2023-02-22T12:37:38.612" v="1843" actId="207"/>
@@ -1174,30 +494,30 @@
           <pc:docMk/>
           <pc:sldMk cId="4032496496" sldId="592"/>
         </pc:sldMkLst>
+      </pc:sldChg>
+    </pc:docChg>
+  </pc:docChgLst>
+  <pc:docChgLst>
+    <pc:chgData name="Gerth Stølting Brodal" userId="04ef4784-6591-4f86-a140-f5c3b108582a" providerId="ADAL" clId="{F3ECE93C-6A89-44E4-B55D-A95418A85687}"/>
+    <pc:docChg chg="modSld">
+      <pc:chgData name="Gerth Stølting Brodal" userId="04ef4784-6591-4f86-a140-f5c3b108582a" providerId="ADAL" clId="{F3ECE93C-6A89-44E4-B55D-A95418A85687}" dt="2025-02-19T08:39:04.683" v="0" actId="115"/>
+      <pc:docMkLst>
+        <pc:docMk/>
+      </pc:docMkLst>
+      <pc:sldChg chg="modSp mod">
+        <pc:chgData name="Gerth Stølting Brodal" userId="04ef4784-6591-4f86-a140-f5c3b108582a" providerId="ADAL" clId="{F3ECE93C-6A89-44E4-B55D-A95418A85687}" dt="2025-02-19T08:39:04.683" v="0" actId="115"/>
+        <pc:sldMkLst>
+          <pc:docMk/>
+          <pc:sldMk cId="905431858" sldId="569"/>
+        </pc:sldMkLst>
         <pc:spChg chg="mod">
-          <ac:chgData name="Gerth Stølting Brodal" userId="04ef4784-6591-4f86-a140-f5c3b108582a" providerId="ADAL" clId="{89EC5210-EF5D-482B-9301-5C971FABFA3E}" dt="2023-02-18T09:56:08.573" v="395" actId="5793"/>
+          <ac:chgData name="Gerth Stølting Brodal" userId="04ef4784-6591-4f86-a140-f5c3b108582a" providerId="ADAL" clId="{F3ECE93C-6A89-44E4-B55D-A95418A85687}" dt="2025-02-19T08:39:04.683" v="0" actId="115"/>
           <ac:spMkLst>
             <pc:docMk/>
-            <pc:sldMk cId="4032496496" sldId="592"/>
+            <pc:sldMk cId="905431858" sldId="569"/>
             <ac:spMk id="2" creationId="{00000000-0000-0000-0000-000000000000}"/>
           </ac:spMkLst>
         </pc:spChg>
-        <pc:graphicFrameChg chg="mod modGraphic">
-          <ac:chgData name="Gerth Stølting Brodal" userId="04ef4784-6591-4f86-a140-f5c3b108582a" providerId="ADAL" clId="{89EC5210-EF5D-482B-9301-5C971FABFA3E}" dt="2023-02-22T12:37:38.612" v="1843" actId="207"/>
-          <ac:graphicFrameMkLst>
-            <pc:docMk/>
-            <pc:sldMk cId="4032496496" sldId="592"/>
-            <ac:graphicFrameMk id="4" creationId="{00000000-0000-0000-0000-000000000000}"/>
-          </ac:graphicFrameMkLst>
-        </pc:graphicFrameChg>
-        <pc:picChg chg="add mod">
-          <ac:chgData name="Gerth Stølting Brodal" userId="04ef4784-6591-4f86-a140-f5c3b108582a" providerId="ADAL" clId="{89EC5210-EF5D-482B-9301-5C971FABFA3E}" dt="2023-02-18T10:40:07.227" v="962" actId="1036"/>
-          <ac:picMkLst>
-            <pc:docMk/>
-            <pc:sldMk cId="4032496496" sldId="592"/>
-            <ac:picMk id="3" creationId="{2B43A2BC-779E-C234-99D4-577D483AB71A}"/>
-          </ac:picMkLst>
-        </pc:picChg>
       </pc:sldChg>
     </pc:docChg>
   </pc:docChgLst>
@@ -1286,7 +606,7 @@
           <a:p>
             <a:fld id="{FB1A172F-81D4-4DC4-9113-1DBD56EC3646}" type="datetimeFigureOut">
               <a:rPr lang="en-US" smtClean="0"/>
-              <a:t>2/21/2024</a:t>
+              <a:t>2/19/2025</a:t>
             </a:fld>
             <a:endParaRPr lang="en-US"/>
           </a:p>
@@ -4400,7 +3720,7 @@
           <a:p>
             <a:fld id="{0560A9CD-0304-4E0B-9E82-E7E0115DE05B}" type="datetimeFigureOut">
               <a:rPr lang="en-US" smtClean="0"/>
-              <a:t>2/21/2024</a:t>
+              <a:t>2/19/2025</a:t>
             </a:fld>
             <a:endParaRPr lang="en-US"/>
           </a:p>
@@ -4568,7 +3888,7 @@
           <a:p>
             <a:fld id="{0560A9CD-0304-4E0B-9E82-E7E0115DE05B}" type="datetimeFigureOut">
               <a:rPr lang="en-US" smtClean="0"/>
-              <a:t>2/21/2024</a:t>
+              <a:t>2/19/2025</a:t>
             </a:fld>
             <a:endParaRPr lang="en-US"/>
           </a:p>
@@ -4746,7 +4066,7 @@
           <a:p>
             <a:fld id="{0560A9CD-0304-4E0B-9E82-E7E0115DE05B}" type="datetimeFigureOut">
               <a:rPr lang="en-US" smtClean="0"/>
-              <a:t>2/21/2024</a:t>
+              <a:t>2/19/2025</a:t>
             </a:fld>
             <a:endParaRPr lang="en-US"/>
           </a:p>
@@ -4929,7 +4249,7 @@
           <a:p>
             <a:fld id="{0560A9CD-0304-4E0B-9E82-E7E0115DE05B}" type="datetimeFigureOut">
               <a:rPr lang="en-US" smtClean="0"/>
-              <a:t>2/21/2024</a:t>
+              <a:t>2/19/2025</a:t>
             </a:fld>
             <a:endParaRPr lang="en-US"/>
           </a:p>
@@ -5174,7 +4494,7 @@
           <a:p>
             <a:fld id="{0560A9CD-0304-4E0B-9E82-E7E0115DE05B}" type="datetimeFigureOut">
               <a:rPr lang="en-US" smtClean="0"/>
-              <a:t>2/21/2024</a:t>
+              <a:t>2/19/2025</a:t>
             </a:fld>
             <a:endParaRPr lang="en-US"/>
           </a:p>
@@ -5403,7 +4723,7 @@
           <a:p>
             <a:fld id="{0560A9CD-0304-4E0B-9E82-E7E0115DE05B}" type="datetimeFigureOut">
               <a:rPr lang="en-US" smtClean="0"/>
-              <a:t>2/21/2024</a:t>
+              <a:t>2/19/2025</a:t>
             </a:fld>
             <a:endParaRPr lang="en-US"/>
           </a:p>
@@ -5767,7 +5087,7 @@
           <a:p>
             <a:fld id="{0560A9CD-0304-4E0B-9E82-E7E0115DE05B}" type="datetimeFigureOut">
               <a:rPr lang="en-US" smtClean="0"/>
-              <a:t>2/21/2024</a:t>
+              <a:t>2/19/2025</a:t>
             </a:fld>
             <a:endParaRPr lang="en-US"/>
           </a:p>
@@ -5884,7 +5204,7 @@
           <a:p>
             <a:fld id="{0560A9CD-0304-4E0B-9E82-E7E0115DE05B}" type="datetimeFigureOut">
               <a:rPr lang="en-US" smtClean="0"/>
-              <a:t>2/21/2024</a:t>
+              <a:t>2/19/2025</a:t>
             </a:fld>
             <a:endParaRPr lang="en-US"/>
           </a:p>
@@ -5979,7 +5299,7 @@
           <a:p>
             <a:fld id="{0560A9CD-0304-4E0B-9E82-E7E0115DE05B}" type="datetimeFigureOut">
               <a:rPr lang="en-US" smtClean="0"/>
-              <a:t>2/21/2024</a:t>
+              <a:t>2/19/2025</a:t>
             </a:fld>
             <a:endParaRPr lang="en-US"/>
           </a:p>
@@ -6254,7 +5574,7 @@
           <a:p>
             <a:fld id="{0560A9CD-0304-4E0B-9E82-E7E0115DE05B}" type="datetimeFigureOut">
               <a:rPr lang="en-US" smtClean="0"/>
-              <a:t>2/21/2024</a:t>
+              <a:t>2/19/2025</a:t>
             </a:fld>
             <a:endParaRPr lang="en-US"/>
           </a:p>
@@ -6506,7 +5826,7 @@
           <a:p>
             <a:fld id="{0560A9CD-0304-4E0B-9E82-E7E0115DE05B}" type="datetimeFigureOut">
               <a:rPr lang="en-US" smtClean="0"/>
-              <a:t>2/21/2024</a:t>
+              <a:t>2/19/2025</a:t>
             </a:fld>
             <a:endParaRPr lang="en-US"/>
           </a:p>
@@ -6717,7 +6037,7 @@
           <a:p>
             <a:fld id="{0560A9CD-0304-4E0B-9E82-E7E0115DE05B}" type="datetimeFigureOut">
               <a:rPr lang="en-US" smtClean="0"/>
-              <a:t>2/21/2024</a:t>
+              <a:t>2/19/2025</a:t>
             </a:fld>
             <a:endParaRPr lang="en-US"/>
           </a:p>
@@ -8028,18 +7348,18 @@
               <a:t> a list of arguments in a </a:t>
             </a:r>
             <a:r>
-              <a:rPr lang="da-DK" dirty="0" err="1"/>
+              <a:rPr lang="da-DK" u="sng" dirty="0" err="1"/>
               <a:t>function</a:t>
             </a:r>
             <a:r>
-              <a:rPr lang="da-DK" dirty="0"/>
+              <a:rPr lang="da-DK" u="sng" dirty="0"/>
               <a:t> </a:t>
             </a:r>
             <a:r>
-              <a:rPr lang="da-DK" dirty="0" err="1"/>
+              <a:rPr lang="da-DK" u="sng" dirty="0" err="1"/>
               <a:t>call</a:t>
             </a:r>
-            <a:endParaRPr lang="en-US" dirty="0"/>
+            <a:endParaRPr lang="en-US" u="sng" dirty="0"/>
           </a:p>
         </p:txBody>
       </p:sp>

</xml_diff>

<commit_message>
exam-past.md ipsa25.zip ispa25answers.zip all-slides.pdf functions.pdf functions.pptx linear_programming.pdf linear_programming.pptx
</commit_message>
<xml_diff>
--- a/ipsa/slides/functions.pptx
+++ b/ipsa/slides/functions.pptx
@@ -510,14 +510,6 @@
           <pc:docMk/>
           <pc:sldMk cId="905431858" sldId="569"/>
         </pc:sldMkLst>
-        <pc:spChg chg="mod">
-          <ac:chgData name="Gerth Stølting Brodal" userId="04ef4784-6591-4f86-a140-f5c3b108582a" providerId="ADAL" clId="{F3ECE93C-6A89-44E4-B55D-A95418A85687}" dt="2025-02-19T08:39:04.683" v="0" actId="115"/>
-          <ac:spMkLst>
-            <pc:docMk/>
-            <pc:sldMk cId="905431858" sldId="569"/>
-            <ac:spMk id="2" creationId="{00000000-0000-0000-0000-000000000000}"/>
-          </ac:spMkLst>
-        </pc:spChg>
       </pc:sldChg>
     </pc:docChg>
   </pc:docChgLst>
@@ -606,7 +598,7 @@
           <a:p>
             <a:fld id="{FB1A172F-81D4-4DC4-9113-1DBD56EC3646}" type="datetimeFigureOut">
               <a:rPr lang="en-US" smtClean="0"/>
-              <a:t>2/19/2025</a:t>
+              <a:t>6/14/2025</a:t>
             </a:fld>
             <a:endParaRPr lang="en-US"/>
           </a:p>
@@ -3720,7 +3712,7 @@
           <a:p>
             <a:fld id="{0560A9CD-0304-4E0B-9E82-E7E0115DE05B}" type="datetimeFigureOut">
               <a:rPr lang="en-US" smtClean="0"/>
-              <a:t>2/19/2025</a:t>
+              <a:t>6/14/2025</a:t>
             </a:fld>
             <a:endParaRPr lang="en-US"/>
           </a:p>
@@ -3888,7 +3880,7 @@
           <a:p>
             <a:fld id="{0560A9CD-0304-4E0B-9E82-E7E0115DE05B}" type="datetimeFigureOut">
               <a:rPr lang="en-US" smtClean="0"/>
-              <a:t>2/19/2025</a:t>
+              <a:t>6/14/2025</a:t>
             </a:fld>
             <a:endParaRPr lang="en-US"/>
           </a:p>
@@ -4066,7 +4058,7 @@
           <a:p>
             <a:fld id="{0560A9CD-0304-4E0B-9E82-E7E0115DE05B}" type="datetimeFigureOut">
               <a:rPr lang="en-US" smtClean="0"/>
-              <a:t>2/19/2025</a:t>
+              <a:t>6/14/2025</a:t>
             </a:fld>
             <a:endParaRPr lang="en-US"/>
           </a:p>
@@ -4249,7 +4241,7 @@
           <a:p>
             <a:fld id="{0560A9CD-0304-4E0B-9E82-E7E0115DE05B}" type="datetimeFigureOut">
               <a:rPr lang="en-US" smtClean="0"/>
-              <a:t>2/19/2025</a:t>
+              <a:t>6/14/2025</a:t>
             </a:fld>
             <a:endParaRPr lang="en-US"/>
           </a:p>
@@ -4494,7 +4486,7 @@
           <a:p>
             <a:fld id="{0560A9CD-0304-4E0B-9E82-E7E0115DE05B}" type="datetimeFigureOut">
               <a:rPr lang="en-US" smtClean="0"/>
-              <a:t>2/19/2025</a:t>
+              <a:t>6/14/2025</a:t>
             </a:fld>
             <a:endParaRPr lang="en-US"/>
           </a:p>
@@ -4723,7 +4715,7 @@
           <a:p>
             <a:fld id="{0560A9CD-0304-4E0B-9E82-E7E0115DE05B}" type="datetimeFigureOut">
               <a:rPr lang="en-US" smtClean="0"/>
-              <a:t>2/19/2025</a:t>
+              <a:t>6/14/2025</a:t>
             </a:fld>
             <a:endParaRPr lang="en-US"/>
           </a:p>
@@ -5087,7 +5079,7 @@
           <a:p>
             <a:fld id="{0560A9CD-0304-4E0B-9E82-E7E0115DE05B}" type="datetimeFigureOut">
               <a:rPr lang="en-US" smtClean="0"/>
-              <a:t>2/19/2025</a:t>
+              <a:t>6/14/2025</a:t>
             </a:fld>
             <a:endParaRPr lang="en-US"/>
           </a:p>
@@ -5204,7 +5196,7 @@
           <a:p>
             <a:fld id="{0560A9CD-0304-4E0B-9E82-E7E0115DE05B}" type="datetimeFigureOut">
               <a:rPr lang="en-US" smtClean="0"/>
-              <a:t>2/19/2025</a:t>
+              <a:t>6/14/2025</a:t>
             </a:fld>
             <a:endParaRPr lang="en-US"/>
           </a:p>
@@ -5299,7 +5291,7 @@
           <a:p>
             <a:fld id="{0560A9CD-0304-4E0B-9E82-E7E0115DE05B}" type="datetimeFigureOut">
               <a:rPr lang="en-US" smtClean="0"/>
-              <a:t>2/19/2025</a:t>
+              <a:t>6/14/2025</a:t>
             </a:fld>
             <a:endParaRPr lang="en-US"/>
           </a:p>
@@ -5574,7 +5566,7 @@
           <a:p>
             <a:fld id="{0560A9CD-0304-4E0B-9E82-E7E0115DE05B}" type="datetimeFigureOut">
               <a:rPr lang="en-US" smtClean="0"/>
-              <a:t>2/19/2025</a:t>
+              <a:t>6/14/2025</a:t>
             </a:fld>
             <a:endParaRPr lang="en-US"/>
           </a:p>
@@ -5826,7 +5818,7 @@
           <a:p>
             <a:fld id="{0560A9CD-0304-4E0B-9E82-E7E0115DE05B}" type="datetimeFigureOut">
               <a:rPr lang="en-US" smtClean="0"/>
-              <a:t>2/19/2025</a:t>
+              <a:t>6/14/2025</a:t>
             </a:fld>
             <a:endParaRPr lang="en-US"/>
           </a:p>
@@ -6037,7 +6029,7 @@
           <a:p>
             <a:fld id="{0560A9CD-0304-4E0B-9E82-E7E0115DE05B}" type="datetimeFigureOut">
               <a:rPr lang="en-US" smtClean="0"/>
-              <a:t>2/19/2025</a:t>
+              <a:t>6/14/2025</a:t>
             </a:fld>
             <a:endParaRPr lang="en-US"/>
           </a:p>
@@ -11017,12 +11009,14 @@
         </p:nvSpPr>
         <p:spPr>
           <a:xfrm>
-            <a:off x="838200" y="1825625"/>
-            <a:ext cx="10515600" cy="2132421"/>
+            <a:off x="838200" y="4038600"/>
+            <a:ext cx="10683240" cy="2819400"/>
           </a:xfrm>
         </p:spPr>
         <p:txBody>
-          <a:bodyPr/>
+          <a:bodyPr>
+            <a:normAutofit/>
+          </a:bodyPr>
           <a:lstStyle/>
           <a:p>
             <a:r>
@@ -11189,6 +11183,119 @@
                 <a:cs typeface="Courier New" panose="02070309020205020404" pitchFamily="49" charset="0"/>
               </a:rPr>
               <a:t>without</a:t>
+            </a:r>
+            <a:endParaRPr lang="da-DK" dirty="0">
+              <a:cs typeface="Courier New" panose="02070309020205020404" pitchFamily="49" charset="0"/>
+            </a:endParaRPr>
+          </a:p>
+          <a:p>
+            <a:r>
+              <a:rPr lang="da-DK" dirty="0">
+                <a:cs typeface="Courier New" panose="02070309020205020404" pitchFamily="49" charset="0"/>
+              </a:rPr>
+              <a:t>Default arguments </a:t>
+            </a:r>
+            <a:r>
+              <a:rPr lang="da-DK" dirty="0" err="1">
+                <a:cs typeface="Courier New" panose="02070309020205020404" pitchFamily="49" charset="0"/>
+              </a:rPr>
+              <a:t>are</a:t>
+            </a:r>
+            <a:r>
+              <a:rPr lang="da-DK" dirty="0">
+                <a:cs typeface="Courier New" panose="02070309020205020404" pitchFamily="49" charset="0"/>
+              </a:rPr>
+              <a:t> </a:t>
+            </a:r>
+            <a:r>
+              <a:rPr lang="da-DK" dirty="0" err="1">
+                <a:cs typeface="Courier New" panose="02070309020205020404" pitchFamily="49" charset="0"/>
+              </a:rPr>
+              <a:t>e.g</a:t>
+            </a:r>
+            <a:r>
+              <a:rPr lang="da-DK" dirty="0">
+                <a:cs typeface="Courier New" panose="02070309020205020404" pitchFamily="49" charset="0"/>
+              </a:rPr>
+              <a:t>. </a:t>
+            </a:r>
+            <a:r>
+              <a:rPr lang="da-DK" dirty="0" err="1">
+                <a:cs typeface="Courier New" panose="02070309020205020404" pitchFamily="49" charset="0"/>
+              </a:rPr>
+              <a:t>also</a:t>
+            </a:r>
+            <a:r>
+              <a:rPr lang="da-DK" dirty="0">
+                <a:cs typeface="Courier New" panose="02070309020205020404" pitchFamily="49" charset="0"/>
+              </a:rPr>
+              <a:t> </a:t>
+            </a:r>
+            <a:r>
+              <a:rPr lang="da-DK" dirty="0" err="1">
+                <a:cs typeface="Courier New" panose="02070309020205020404" pitchFamily="49" charset="0"/>
+              </a:rPr>
+              <a:t>available</a:t>
+            </a:r>
+            <a:r>
+              <a:rPr lang="da-DK" dirty="0">
+                <a:cs typeface="Courier New" panose="02070309020205020404" pitchFamily="49" charset="0"/>
+              </a:rPr>
+              <a:t> in </a:t>
+            </a:r>
+            <a:r>
+              <a:rPr lang="da-DK" dirty="0" err="1">
+                <a:cs typeface="Courier New" panose="02070309020205020404" pitchFamily="49" charset="0"/>
+              </a:rPr>
+              <a:t>Javascript</a:t>
+            </a:r>
+            <a:r>
+              <a:rPr lang="da-DK" dirty="0">
+                <a:cs typeface="Courier New" panose="02070309020205020404" pitchFamily="49" charset="0"/>
+              </a:rPr>
+              <a:t>, C++ and C#, and </a:t>
+            </a:r>
+            <a:r>
+              <a:rPr lang="da-DK" dirty="0" err="1">
+                <a:cs typeface="Courier New" panose="02070309020205020404" pitchFamily="49" charset="0"/>
+              </a:rPr>
+              <a:t>keyword</a:t>
+            </a:r>
+            <a:r>
+              <a:rPr lang="da-DK" dirty="0">
+                <a:cs typeface="Courier New" panose="02070309020205020404" pitchFamily="49" charset="0"/>
+              </a:rPr>
+              <a:t> arguments in </a:t>
+            </a:r>
+            <a:r>
+              <a:rPr lang="da-DK" dirty="0" err="1">
+                <a:cs typeface="Courier New" panose="02070309020205020404" pitchFamily="49" charset="0"/>
+              </a:rPr>
+              <a:t>e.g</a:t>
+            </a:r>
+            <a:r>
+              <a:rPr lang="da-DK" dirty="0">
+                <a:cs typeface="Courier New" panose="02070309020205020404" pitchFamily="49" charset="0"/>
+              </a:rPr>
+              <a:t>. </a:t>
+            </a:r>
+            <a:r>
+              <a:rPr lang="da-DK" dirty="0" err="1">
+                <a:cs typeface="Courier New" panose="02070309020205020404" pitchFamily="49" charset="0"/>
+              </a:rPr>
+              <a:t>Javascript</a:t>
+            </a:r>
+            <a:r>
+              <a:rPr lang="da-DK" dirty="0">
+                <a:cs typeface="Courier New" panose="02070309020205020404" pitchFamily="49" charset="0"/>
+              </a:rPr>
+              <a:t> and </a:t>
+            </a:r>
+            <a:r>
+              <a:rPr lang="da-DK" dirty="0" err="1">
+                <a:cs typeface="Courier New" panose="02070309020205020404" pitchFamily="49" charset="0"/>
+              </a:rPr>
+              <a:t>C#s</a:t>
             </a:r>
             <a:endParaRPr lang="da-DK" dirty="0">
               <a:cs typeface="Courier New" panose="02070309020205020404" pitchFamily="49" charset="0"/>
@@ -11205,13 +11312,13 @@
           <p:nvPr>
             <p:extLst>
               <p:ext uri="{D42A27DB-BD31-4B8C-83A1-F6EECF244321}">
-                <p14:modId xmlns:p14="http://schemas.microsoft.com/office/powerpoint/2010/main" val="1063123830"/>
+                <p14:modId xmlns:p14="http://schemas.microsoft.com/office/powerpoint/2010/main" val="3197314453"/>
               </p:ext>
             </p:extLst>
           </p:nvPr>
         </p:nvGraphicFramePr>
         <p:xfrm>
-          <a:off x="3499485" y="4262800"/>
+          <a:off x="3499485" y="1825625"/>
           <a:ext cx="5193030" cy="1706880"/>
         </p:xfrm>
         <a:graphic>
@@ -11358,7 +11465,41 @@
                           <a:latin typeface="Courier New" panose="02070309020205020404" pitchFamily="49" charset="0"/>
                           <a:cs typeface="Courier New" panose="02070309020205020404" pitchFamily="49" charset="0"/>
                         </a:rPr>
-                        <a:t>(a, b, c=5, d=7):</a:t>
+                        <a:t>(a, b, c</a:t>
+                      </a:r>
+                      <a:r>
+                        <a:rPr lang="en-US" sz="1800" b="1" baseline="0" dirty="0">
+                          <a:solidFill>
+                            <a:srgbClr val="C00000"/>
+                          </a:solidFill>
+                          <a:latin typeface="Courier New" panose="02070309020205020404" pitchFamily="49" charset="0"/>
+                          <a:cs typeface="Courier New" panose="02070309020205020404" pitchFamily="49" charset="0"/>
+                        </a:rPr>
+                        <a:t>=5</a:t>
+                      </a:r>
+                      <a:r>
+                        <a:rPr lang="en-US" sz="1800" b="1" baseline="0" dirty="0">
+                          <a:latin typeface="Courier New" panose="02070309020205020404" pitchFamily="49" charset="0"/>
+                          <a:cs typeface="Courier New" panose="02070309020205020404" pitchFamily="49" charset="0"/>
+                        </a:rPr>
+                        <a:t>, d</a:t>
+                      </a:r>
+                      <a:r>
+                        <a:rPr lang="en-US" sz="1800" b="1" baseline="0" dirty="0">
+                          <a:solidFill>
+                            <a:srgbClr val="C00000"/>
+                          </a:solidFill>
+                          <a:latin typeface="Courier New" panose="02070309020205020404" pitchFamily="49" charset="0"/>
+                          <a:cs typeface="Courier New" panose="02070309020205020404" pitchFamily="49" charset="0"/>
+                        </a:rPr>
+                        <a:t>=7</a:t>
+                      </a:r>
+                      <a:r>
+                        <a:rPr lang="en-US" sz="1800" b="1" baseline="0" dirty="0">
+                          <a:latin typeface="Courier New" panose="02070309020205020404" pitchFamily="49" charset="0"/>
+                          <a:cs typeface="Courier New" panose="02070309020205020404" pitchFamily="49" charset="0"/>
+                        </a:rPr>
+                        <a:t>):</a:t>
                       </a:r>
                     </a:p>
                     <a:p>
@@ -11412,7 +11553,41 @@
                           <a:latin typeface="Courier New" panose="02070309020205020404" pitchFamily="49" charset="0"/>
                           <a:cs typeface="Courier New" panose="02070309020205020404" pitchFamily="49" charset="0"/>
                         </a:rPr>
-                        <a:t>(2, d=3, b=4)</a:t>
+                        <a:t>(2, </a:t>
+                      </a:r>
+                      <a:r>
+                        <a:rPr lang="en-US" sz="1800" b="1" baseline="0" dirty="0">
+                          <a:solidFill>
+                            <a:srgbClr val="C00000"/>
+                          </a:solidFill>
+                          <a:latin typeface="Courier New" panose="02070309020205020404" pitchFamily="49" charset="0"/>
+                          <a:cs typeface="Courier New" panose="02070309020205020404" pitchFamily="49" charset="0"/>
+                        </a:rPr>
+                        <a:t>d=</a:t>
+                      </a:r>
+                      <a:r>
+                        <a:rPr lang="en-US" sz="1800" b="1" baseline="0" dirty="0">
+                          <a:latin typeface="Courier New" panose="02070309020205020404" pitchFamily="49" charset="0"/>
+                          <a:cs typeface="Courier New" panose="02070309020205020404" pitchFamily="49" charset="0"/>
+                        </a:rPr>
+                        <a:t>3, </a:t>
+                      </a:r>
+                      <a:r>
+                        <a:rPr lang="en-US" sz="1800" b="1" baseline="0" dirty="0">
+                          <a:solidFill>
+                            <a:srgbClr val="C00000"/>
+                          </a:solidFill>
+                          <a:latin typeface="Courier New" panose="02070309020205020404" pitchFamily="49" charset="0"/>
+                          <a:cs typeface="Courier New" panose="02070309020205020404" pitchFamily="49" charset="0"/>
+                        </a:rPr>
+                        <a:t>b=</a:t>
+                      </a:r>
+                      <a:r>
+                        <a:rPr lang="en-US" sz="1800" b="1" baseline="0" dirty="0">
+                          <a:latin typeface="Courier New" panose="02070309020205020404" pitchFamily="49" charset="0"/>
+                          <a:cs typeface="Courier New" panose="02070309020205020404" pitchFamily="49" charset="0"/>
+                        </a:rPr>
+                        <a:t>4)</a:t>
                       </a:r>
                     </a:p>
                     <a:p>

</xml_diff>

<commit_message>
all-slides-with-answers.pdf all-slides.pdf functions.pdf functions.pptx recursion.pdf recursion.pptx
</commit_message>
<xml_diff>
--- a/ipsa/slides/functions.pptx
+++ b/ipsa/slides/functions.pptx
@@ -147,7 +147,7 @@
 <file path=ppt/revisionInfo.xml><?xml version="1.0" encoding="utf-8"?>
 <p1510:revInfo xmlns:a="http://schemas.openxmlformats.org/drawingml/2006/main" xmlns:r="http://schemas.openxmlformats.org/officeDocument/2006/relationships" xmlns:p1510="http://schemas.microsoft.com/office/powerpoint/2015/10/main">
   <p1510:revLst>
-    <p1510:client id="{6D2F9BD2-2A9D-4BE7-AE08-43A9C64180DC}" v="2" dt="2025-10-27T18:20:50.616"/>
+    <p1510:client id="{66B0FE2B-5DFD-441C-B749-77C7754134CC}" v="2" dt="2026-02-15T20:43:41.227"/>
   </p1510:revLst>
 </p1510:revInfo>
 </file>
@@ -155,452 +155,46 @@
 <file path=ppt/changesInfos/changesInfo1.xml><?xml version="1.0" encoding="utf-8"?>
 <pc:chgInfo xmlns:a="http://schemas.openxmlformats.org/drawingml/2006/main" xmlns:r="http://schemas.openxmlformats.org/officeDocument/2006/relationships" xmlns:ac="http://schemas.microsoft.com/office/drawing/2013/main/command" xmlns:pc="http://schemas.microsoft.com/office/powerpoint/2013/main/command">
   <pc:docChgLst>
-    <pc:chgData name="Gerth Stølting Brodal" userId="04ef4784-6591-4f86-a140-f5c3b108582a" providerId="ADAL" clId="{6E9A0562-012B-4102-8D64-466128A30A98}"/>
-    <pc:docChg chg="undo custSel mod addSld modSld">
-      <pc:chgData name="Gerth Stølting Brodal" userId="04ef4784-6591-4f86-a140-f5c3b108582a" providerId="ADAL" clId="{6E9A0562-012B-4102-8D64-466128A30A98}" dt="2021-02-24T12:05:02.031" v="1363" actId="20577"/>
+    <pc:chgData name="Gerth Stølting Brodal" userId="04ef4784-6591-4f86-a140-f5c3b108582a" providerId="ADAL" clId="{73BAC7D6-516A-44B5-B4B0-C7B08CA8B392}"/>
+    <pc:docChg chg="undo custSel modSld">
+      <pc:chgData name="Gerth Stølting Brodal" userId="04ef4784-6591-4f86-a140-f5c3b108582a" providerId="ADAL" clId="{73BAC7D6-516A-44B5-B4B0-C7B08CA8B392}" dt="2026-02-18T08:07:40.404" v="72" actId="20577"/>
       <pc:docMkLst>
         <pc:docMk/>
       </pc:docMkLst>
       <pc:sldChg chg="modSp mod">
-        <pc:chgData name="Gerth Stølting Brodal" userId="04ef4784-6591-4f86-a140-f5c3b108582a" providerId="ADAL" clId="{6E9A0562-012B-4102-8D64-466128A30A98}" dt="2021-02-23T09:29:00.718" v="2" actId="114"/>
+        <pc:chgData name="Gerth Stølting Brodal" userId="04ef4784-6591-4f86-a140-f5c3b108582a" providerId="ADAL" clId="{73BAC7D6-516A-44B5-B4B0-C7B08CA8B392}" dt="2026-02-18T08:07:40.404" v="72" actId="20577"/>
         <pc:sldMkLst>
           <pc:docMk/>
-          <pc:sldMk cId="3628447800" sldId="561"/>
-        </pc:sldMkLst>
-      </pc:sldChg>
-      <pc:sldChg chg="modSp mod">
-        <pc:chgData name="Gerth Stølting Brodal" userId="04ef4784-6591-4f86-a140-f5c3b108582a" providerId="ADAL" clId="{6E9A0562-012B-4102-8D64-466128A30A98}" dt="2021-02-23T09:55:54.848" v="515" actId="6549"/>
-        <pc:sldMkLst>
-          <pc:docMk/>
-          <pc:sldMk cId="188061130" sldId="564"/>
-        </pc:sldMkLst>
-      </pc:sldChg>
-      <pc:sldChg chg="modSp mod">
-        <pc:chgData name="Gerth Stølting Brodal" userId="04ef4784-6591-4f86-a140-f5c3b108582a" providerId="ADAL" clId="{6E9A0562-012B-4102-8D64-466128A30A98}" dt="2021-02-23T10:14:31.547" v="540" actId="20577"/>
-        <pc:sldMkLst>
-          <pc:docMk/>
-          <pc:sldMk cId="3627704936" sldId="566"/>
-        </pc:sldMkLst>
-      </pc:sldChg>
-      <pc:sldChg chg="modSp mod">
-        <pc:chgData name="Gerth Stølting Brodal" userId="04ef4784-6591-4f86-a140-f5c3b108582a" providerId="ADAL" clId="{6E9A0562-012B-4102-8D64-466128A30A98}" dt="2021-02-23T11:20:05.903" v="1079" actId="20577"/>
-        <pc:sldMkLst>
-          <pc:docMk/>
-          <pc:sldMk cId="3579293872" sldId="577"/>
-        </pc:sldMkLst>
-      </pc:sldChg>
-      <pc:sldChg chg="modNotesTx">
-        <pc:chgData name="Gerth Stølting Brodal" userId="04ef4784-6591-4f86-a140-f5c3b108582a" providerId="ADAL" clId="{6E9A0562-012B-4102-8D64-466128A30A98}" dt="2021-02-23T10:35:56.560" v="699" actId="20577"/>
-        <pc:sldMkLst>
-          <pc:docMk/>
-          <pc:sldMk cId="1896777206" sldId="585"/>
-        </pc:sldMkLst>
-      </pc:sldChg>
-      <pc:sldChg chg="addSp delSp modSp add mod modTransition setBg">
-        <pc:chgData name="Gerth Stølting Brodal" userId="04ef4784-6591-4f86-a140-f5c3b108582a" providerId="ADAL" clId="{6E9A0562-012B-4102-8D64-466128A30A98}" dt="2021-02-23T10:49:22.669" v="725" actId="20577"/>
-        <pc:sldMkLst>
-          <pc:docMk/>
-          <pc:sldMk cId="4039368805" sldId="589"/>
-        </pc:sldMkLst>
-      </pc:sldChg>
-      <pc:sldChg chg="addSp modSp new mod modNotesTx">
-        <pc:chgData name="Gerth Stølting Brodal" userId="04ef4784-6591-4f86-a140-f5c3b108582a" providerId="ADAL" clId="{6E9A0562-012B-4102-8D64-466128A30A98}" dt="2021-02-24T12:05:02.031" v="1363" actId="20577"/>
-        <pc:sldMkLst>
-          <pc:docMk/>
-          <pc:sldMk cId="3860775354" sldId="590"/>
-        </pc:sldMkLst>
-      </pc:sldChg>
-    </pc:docChg>
-  </pc:docChgLst>
-  <pc:docChgLst>
-    <pc:chgData name="Gerth Stølting Brodal" userId="04ef4784-6591-4f86-a140-f5c3b108582a" providerId="ADAL" clId="{754E53C0-86C1-454F-8E62-4CC3B55D8DD3}"/>
-    <pc:docChg chg="undo custSel addSld modSld">
-      <pc:chgData name="Gerth Stølting Brodal" userId="04ef4784-6591-4f86-a140-f5c3b108582a" providerId="ADAL" clId="{754E53C0-86C1-454F-8E62-4CC3B55D8DD3}" dt="2022-02-24T08:36:05.368" v="232" actId="1076"/>
-      <pc:docMkLst>
-        <pc:docMk/>
-      </pc:docMkLst>
-      <pc:sldChg chg="modSp mod">
-        <pc:chgData name="Gerth Stølting Brodal" userId="04ef4784-6591-4f86-a140-f5c3b108582a" providerId="ADAL" clId="{754E53C0-86C1-454F-8E62-4CC3B55D8DD3}" dt="2022-02-19T11:20:15.711" v="5" actId="1076"/>
-        <pc:sldMkLst>
-          <pc:docMk/>
-          <pc:sldMk cId="328718495" sldId="401"/>
-        </pc:sldMkLst>
-      </pc:sldChg>
-      <pc:sldChg chg="modNotesTx">
-        <pc:chgData name="Gerth Stølting Brodal" userId="04ef4784-6591-4f86-a140-f5c3b108582a" providerId="ADAL" clId="{754E53C0-86C1-454F-8E62-4CC3B55D8DD3}" dt="2022-02-23T08:18:55.822" v="64"/>
-        <pc:sldMkLst>
-          <pc:docMk/>
-          <pc:sldMk cId="3627704936" sldId="566"/>
-        </pc:sldMkLst>
-      </pc:sldChg>
-      <pc:sldChg chg="modSp mod modNotesTx">
-        <pc:chgData name="Gerth Stølting Brodal" userId="04ef4784-6591-4f86-a140-f5c3b108582a" providerId="ADAL" clId="{754E53C0-86C1-454F-8E62-4CC3B55D8DD3}" dt="2022-02-23T08:11:35.358" v="62" actId="6549"/>
-        <pc:sldMkLst>
-          <pc:docMk/>
-          <pc:sldMk cId="905431858" sldId="569"/>
-        </pc:sldMkLst>
-      </pc:sldChg>
-      <pc:sldChg chg="modSp mod">
-        <pc:chgData name="Gerth Stølting Brodal" userId="04ef4784-6591-4f86-a140-f5c3b108582a" providerId="ADAL" clId="{754E53C0-86C1-454F-8E62-4CC3B55D8DD3}" dt="2022-02-19T11:46:40.373" v="22" actId="20577"/>
-        <pc:sldMkLst>
-          <pc:docMk/>
-          <pc:sldMk cId="826728691" sldId="578"/>
-        </pc:sldMkLst>
-      </pc:sldChg>
-      <pc:sldChg chg="modSp mod">
-        <pc:chgData name="Gerth Stølting Brodal" userId="04ef4784-6591-4f86-a140-f5c3b108582a" providerId="ADAL" clId="{754E53C0-86C1-454F-8E62-4CC3B55D8DD3}" dt="2022-02-19T11:43:34.116" v="20" actId="313"/>
-        <pc:sldMkLst>
-          <pc:docMk/>
-          <pc:sldMk cId="1913637463" sldId="579"/>
-        </pc:sldMkLst>
-      </pc:sldChg>
-      <pc:sldChg chg="modSp mod">
-        <pc:chgData name="Gerth Stølting Brodal" userId="04ef4784-6591-4f86-a140-f5c3b108582a" providerId="ADAL" clId="{754E53C0-86C1-454F-8E62-4CC3B55D8DD3}" dt="2022-02-23T10:18:56.906" v="135" actId="20577"/>
-        <pc:sldMkLst>
-          <pc:docMk/>
-          <pc:sldMk cId="4009993959" sldId="582"/>
-        </pc:sldMkLst>
-      </pc:sldChg>
-      <pc:sldChg chg="modSp mod">
-        <pc:chgData name="Gerth Stølting Brodal" userId="04ef4784-6591-4f86-a140-f5c3b108582a" providerId="ADAL" clId="{754E53C0-86C1-454F-8E62-4CC3B55D8DD3}" dt="2022-02-23T10:15:55.352" v="125" actId="207"/>
-        <pc:sldMkLst>
-          <pc:docMk/>
-          <pc:sldMk cId="1896777206" sldId="585"/>
-        </pc:sldMkLst>
-      </pc:sldChg>
-      <pc:sldChg chg="modSp mod">
-        <pc:chgData name="Gerth Stølting Brodal" userId="04ef4784-6591-4f86-a140-f5c3b108582a" providerId="ADAL" clId="{754E53C0-86C1-454F-8E62-4CC3B55D8DD3}" dt="2022-02-23T10:12:18.240" v="124" actId="207"/>
-        <pc:sldMkLst>
-          <pc:docMk/>
-          <pc:sldMk cId="653558519" sldId="586"/>
-        </pc:sldMkLst>
-      </pc:sldChg>
-      <pc:sldChg chg="modNotesTx">
-        <pc:chgData name="Gerth Stølting Brodal" userId="04ef4784-6591-4f86-a140-f5c3b108582a" providerId="ADAL" clId="{754E53C0-86C1-454F-8E62-4CC3B55D8DD3}" dt="2022-02-20T21:10:59.090" v="53" actId="20577"/>
-        <pc:sldMkLst>
-          <pc:docMk/>
-          <pc:sldMk cId="3860775354" sldId="590"/>
-        </pc:sldMkLst>
-      </pc:sldChg>
-      <pc:sldChg chg="addSp delSp modSp add mod modNotesTx">
-        <pc:chgData name="Gerth Stølting Brodal" userId="04ef4784-6591-4f86-a140-f5c3b108582a" providerId="ADAL" clId="{754E53C0-86C1-454F-8E62-4CC3B55D8DD3}" dt="2022-02-24T08:36:05.368" v="232" actId="1076"/>
-        <pc:sldMkLst>
-          <pc:docMk/>
-          <pc:sldMk cId="3400063430" sldId="591"/>
-        </pc:sldMkLst>
-      </pc:sldChg>
-    </pc:docChg>
-  </pc:docChgLst>
-  <pc:docChgLst>
-    <pc:chgData name="Gerth Stølting Brodal" userId="04ef4784-6591-4f86-a140-f5c3b108582a" providerId="ADAL" clId="{27124F44-A0F7-408A-AA2B-2C5136C1DC06}"/>
-    <pc:docChg chg="modSld">
-      <pc:chgData name="Gerth Stølting Brodal" userId="04ef4784-6591-4f86-a140-f5c3b108582a" providerId="ADAL" clId="{27124F44-A0F7-408A-AA2B-2C5136C1DC06}" dt="2025-10-27T18:21:46.484" v="21" actId="962"/>
-      <pc:docMkLst>
-        <pc:docMk/>
-      </pc:docMkLst>
-      <pc:sldChg chg="modSp mod">
-        <pc:chgData name="Gerth Stølting Brodal" userId="04ef4784-6591-4f86-a140-f5c3b108582a" providerId="ADAL" clId="{27124F44-A0F7-408A-AA2B-2C5136C1DC06}" dt="2025-10-27T18:20:44.328" v="12" actId="1037"/>
-        <pc:sldMkLst>
-          <pc:docMk/>
-          <pc:sldMk cId="328718495" sldId="401"/>
+          <pc:sldMk cId="2099313752" sldId="567"/>
         </pc:sldMkLst>
         <pc:spChg chg="mod">
-          <ac:chgData name="Gerth Stølting Brodal" userId="04ef4784-6591-4f86-a140-f5c3b108582a" providerId="ADAL" clId="{27124F44-A0F7-408A-AA2B-2C5136C1DC06}" dt="2025-10-27T18:20:44.328" v="12" actId="1037"/>
+          <ac:chgData name="Gerth Stølting Brodal" userId="04ef4784-6591-4f86-a140-f5c3b108582a" providerId="ADAL" clId="{73BAC7D6-516A-44B5-B4B0-C7B08CA8B392}" dt="2026-02-18T08:07:40.404" v="72" actId="20577"/>
           <ac:spMkLst>
             <pc:docMk/>
-            <pc:sldMk cId="328718495" sldId="401"/>
-            <ac:spMk id="4" creationId="{00000000-0000-0000-0000-000000000000}"/>
+            <pc:sldMk cId="2099313752" sldId="567"/>
+            <ac:spMk id="3" creationId="{00000000-0000-0000-0000-000000000000}"/>
           </ac:spMkLst>
         </pc:spChg>
       </pc:sldChg>
-      <pc:sldChg chg="modSp mod">
-        <pc:chgData name="Gerth Stølting Brodal" userId="04ef4784-6591-4f86-a140-f5c3b108582a" providerId="ADAL" clId="{27124F44-A0F7-408A-AA2B-2C5136C1DC06}" dt="2025-10-27T18:21:03.990" v="19" actId="962"/>
-        <pc:sldMkLst>
-          <pc:docMk/>
-          <pc:sldMk cId="3400112957" sldId="543"/>
-        </pc:sldMkLst>
-        <pc:spChg chg="mod">
-          <ac:chgData name="Gerth Stølting Brodal" userId="04ef4784-6591-4f86-a140-f5c3b108582a" providerId="ADAL" clId="{27124F44-A0F7-408A-AA2B-2C5136C1DC06}" dt="2025-10-27T18:21:03.990" v="19" actId="962"/>
-          <ac:spMkLst>
-            <pc:docMk/>
-            <pc:sldMk cId="3400112957" sldId="543"/>
-            <ac:spMk id="4" creationId="{00000000-0000-0000-0000-000000000000}"/>
-          </ac:spMkLst>
-        </pc:spChg>
-      </pc:sldChg>
-      <pc:sldChg chg="modSp mod">
-        <pc:chgData name="Gerth Stølting Brodal" userId="04ef4784-6591-4f86-a140-f5c3b108582a" providerId="ADAL" clId="{27124F44-A0F7-408A-AA2B-2C5136C1DC06}" dt="2025-10-27T18:20:59.524" v="17" actId="962"/>
-        <pc:sldMkLst>
-          <pc:docMk/>
-          <pc:sldMk cId="2250928843" sldId="573"/>
-        </pc:sldMkLst>
-        <pc:spChg chg="mod">
-          <ac:chgData name="Gerth Stølting Brodal" userId="04ef4784-6591-4f86-a140-f5c3b108582a" providerId="ADAL" clId="{27124F44-A0F7-408A-AA2B-2C5136C1DC06}" dt="2025-10-27T18:20:59.524" v="17" actId="962"/>
-          <ac:spMkLst>
-            <pc:docMk/>
-            <pc:sldMk cId="2250928843" sldId="573"/>
-            <ac:spMk id="4" creationId="{00000000-0000-0000-0000-000000000000}"/>
-          </ac:spMkLst>
-        </pc:spChg>
-      </pc:sldChg>
-      <pc:sldChg chg="modSp mod">
-        <pc:chgData name="Gerth Stølting Brodal" userId="04ef4784-6591-4f86-a140-f5c3b108582a" providerId="ADAL" clId="{27124F44-A0F7-408A-AA2B-2C5136C1DC06}" dt="2025-10-27T18:20:51.937" v="15" actId="962"/>
-        <pc:sldMkLst>
-          <pc:docMk/>
-          <pc:sldMk cId="4056481231" sldId="576"/>
-        </pc:sldMkLst>
-        <pc:spChg chg="mod">
-          <ac:chgData name="Gerth Stølting Brodal" userId="04ef4784-6591-4f86-a140-f5c3b108582a" providerId="ADAL" clId="{27124F44-A0F7-408A-AA2B-2C5136C1DC06}" dt="2025-10-27T18:20:51.937" v="15" actId="962"/>
-          <ac:spMkLst>
-            <pc:docMk/>
-            <pc:sldMk cId="4056481231" sldId="576"/>
-            <ac:spMk id="4" creationId="{00000000-0000-0000-0000-000000000000}"/>
-          </ac:spMkLst>
-        </pc:spChg>
-      </pc:sldChg>
-      <pc:sldChg chg="modSp mod">
-        <pc:chgData name="Gerth Stølting Brodal" userId="04ef4784-6591-4f86-a140-f5c3b108582a" providerId="ADAL" clId="{27124F44-A0F7-408A-AA2B-2C5136C1DC06}" dt="2025-10-27T18:21:46.484" v="21" actId="962"/>
-        <pc:sldMkLst>
-          <pc:docMk/>
-          <pc:sldMk cId="1913637463" sldId="579"/>
-        </pc:sldMkLst>
-        <pc:spChg chg="mod">
-          <ac:chgData name="Gerth Stølting Brodal" userId="04ef4784-6591-4f86-a140-f5c3b108582a" providerId="ADAL" clId="{27124F44-A0F7-408A-AA2B-2C5136C1DC06}" dt="2025-10-27T18:21:46.484" v="21" actId="962"/>
-          <ac:spMkLst>
-            <pc:docMk/>
-            <pc:sldMk cId="1913637463" sldId="579"/>
-            <ac:spMk id="4" creationId="{00000000-0000-0000-0000-000000000000}"/>
-          </ac:spMkLst>
-        </pc:spChg>
-      </pc:sldChg>
-    </pc:docChg>
-  </pc:docChgLst>
-  <pc:docChgLst>
-    <pc:chgData name="Gerth Stølting Brodal" userId="04ef4784-6591-4f86-a140-f5c3b108582a" providerId="ADAL" clId="{A438EBA1-DB7D-4DC5-9143-438EE3137945}"/>
-    <pc:docChg chg="undo custSel modSld">
-      <pc:chgData name="Gerth Stølting Brodal" userId="04ef4784-6591-4f86-a140-f5c3b108582a" providerId="ADAL" clId="{A438EBA1-DB7D-4DC5-9143-438EE3137945}" dt="2024-02-21T08:39:08.710" v="607" actId="20577"/>
-      <pc:docMkLst>
-        <pc:docMk/>
-      </pc:docMkLst>
-      <pc:sldChg chg="modSp mod">
-        <pc:chgData name="Gerth Stølting Brodal" userId="04ef4784-6591-4f86-a140-f5c3b108582a" providerId="ADAL" clId="{A438EBA1-DB7D-4DC5-9143-438EE3137945}" dt="2024-02-19T06:43:34.614" v="25" actId="313"/>
-        <pc:sldMkLst>
-          <pc:docMk/>
-          <pc:sldMk cId="188061130" sldId="564"/>
-        </pc:sldMkLst>
-      </pc:sldChg>
-      <pc:sldChg chg="modSp mod">
-        <pc:chgData name="Gerth Stølting Brodal" userId="04ef4784-6591-4f86-a140-f5c3b108582a" providerId="ADAL" clId="{A438EBA1-DB7D-4DC5-9143-438EE3137945}" dt="2024-02-19T07:13:25.896" v="267" actId="207"/>
-        <pc:sldMkLst>
-          <pc:docMk/>
-          <pc:sldMk cId="3627704936" sldId="566"/>
-        </pc:sldMkLst>
-      </pc:sldChg>
-      <pc:sldChg chg="modSp mod modNotesTx">
-        <pc:chgData name="Gerth Stølting Brodal" userId="04ef4784-6591-4f86-a140-f5c3b108582a" providerId="ADAL" clId="{A438EBA1-DB7D-4DC5-9143-438EE3137945}" dt="2024-02-19T06:59:06.914" v="266" actId="20577"/>
+      <pc:sldChg chg="modNotesTx">
+        <pc:chgData name="Gerth Stølting Brodal" userId="04ef4784-6591-4f86-a140-f5c3b108582a" providerId="ADAL" clId="{73BAC7D6-516A-44B5-B4B0-C7B08CA8B392}" dt="2026-02-15T19:50:40.076" v="4" actId="113"/>
         <pc:sldMkLst>
           <pc:docMk/>
           <pc:sldMk cId="100858788" sldId="568"/>
         </pc:sldMkLst>
       </pc:sldChg>
-      <pc:sldChg chg="modSp mod">
-        <pc:chgData name="Gerth Stølting Brodal" userId="04ef4784-6591-4f86-a140-f5c3b108582a" providerId="ADAL" clId="{A438EBA1-DB7D-4DC5-9143-438EE3137945}" dt="2024-02-19T06:50:19.795" v="65" actId="313"/>
-        <pc:sldMkLst>
-          <pc:docMk/>
-          <pc:sldMk cId="1619579666" sldId="574"/>
-        </pc:sldMkLst>
-      </pc:sldChg>
-      <pc:sldChg chg="modSp mod modNotesTx">
-        <pc:chgData name="Gerth Stølting Brodal" userId="04ef4784-6591-4f86-a140-f5c3b108582a" providerId="ADAL" clId="{A438EBA1-DB7D-4DC5-9143-438EE3137945}" dt="2024-02-21T08:20:04.961" v="573" actId="20577"/>
-        <pc:sldMkLst>
-          <pc:docMk/>
-          <pc:sldMk cId="2854255146" sldId="575"/>
-        </pc:sldMkLst>
-      </pc:sldChg>
-      <pc:sldChg chg="modSp mod">
-        <pc:chgData name="Gerth Stølting Brodal" userId="04ef4784-6591-4f86-a140-f5c3b108582a" providerId="ADAL" clId="{A438EBA1-DB7D-4DC5-9143-438EE3137945}" dt="2024-02-19T06:50:14.150" v="57" actId="313"/>
-        <pc:sldMkLst>
-          <pc:docMk/>
-          <pc:sldMk cId="826728691" sldId="578"/>
-        </pc:sldMkLst>
-      </pc:sldChg>
-      <pc:sldChg chg="modSp mod">
-        <pc:chgData name="Gerth Stølting Brodal" userId="04ef4784-6591-4f86-a140-f5c3b108582a" providerId="ADAL" clId="{A438EBA1-DB7D-4DC5-9143-438EE3137945}" dt="2024-02-19T06:50:24.770" v="69" actId="313"/>
-        <pc:sldMkLst>
-          <pc:docMk/>
-          <pc:sldMk cId="4009993959" sldId="582"/>
-        </pc:sldMkLst>
-      </pc:sldChg>
-      <pc:sldChg chg="modSp mod modNotesTx">
-        <pc:chgData name="Gerth Stølting Brodal" userId="04ef4784-6591-4f86-a140-f5c3b108582a" providerId="ADAL" clId="{A438EBA1-DB7D-4DC5-9143-438EE3137945}" dt="2024-02-19T07:27:35.531" v="452" actId="20577"/>
+      <pc:sldChg chg="modNotesTx">
+        <pc:chgData name="Gerth Stølting Brodal" userId="04ef4784-6591-4f86-a140-f5c3b108582a" providerId="ADAL" clId="{73BAC7D6-516A-44B5-B4B0-C7B08CA8B392}" dt="2026-02-15T19:25:44.981" v="2" actId="20577"/>
         <pc:sldMkLst>
           <pc:docMk/>
           <pc:sldMk cId="2874315793" sldId="587"/>
         </pc:sldMkLst>
       </pc:sldChg>
-      <pc:sldChg chg="modSp mod modNotesTx">
-        <pc:chgData name="Gerth Stølting Brodal" userId="04ef4784-6591-4f86-a140-f5c3b108582a" providerId="ADAL" clId="{A438EBA1-DB7D-4DC5-9143-438EE3137945}" dt="2024-02-21T08:27:44.993" v="590" actId="20577"/>
+      <pc:sldChg chg="modNotesTx">
+        <pc:chgData name="Gerth Stølting Brodal" userId="04ef4784-6591-4f86-a140-f5c3b108582a" providerId="ADAL" clId="{73BAC7D6-516A-44B5-B4B0-C7B08CA8B392}" dt="2026-02-15T20:43:41.978" v="58" actId="113"/>
         <pc:sldMkLst>
           <pc:docMk/>
           <pc:sldMk cId="1007572461" sldId="588"/>
-        </pc:sldMkLst>
-      </pc:sldChg>
-      <pc:sldChg chg="modNotesTx">
-        <pc:chgData name="Gerth Stølting Brodal" userId="04ef4784-6591-4f86-a140-f5c3b108582a" providerId="ADAL" clId="{A438EBA1-DB7D-4DC5-9143-438EE3137945}" dt="2024-02-21T08:39:08.710" v="607" actId="20577"/>
-        <pc:sldMkLst>
-          <pc:docMk/>
-          <pc:sldMk cId="3860775354" sldId="590"/>
-        </pc:sldMkLst>
-      </pc:sldChg>
-    </pc:docChg>
-  </pc:docChgLst>
-  <pc:docChgLst>
-    <pc:chgData name="Gerth Stølting Brodal" userId="04ef4784-6591-4f86-a140-f5c3b108582a" providerId="ADAL" clId="{89EC5210-EF5D-482B-9301-5C971FABFA3E}"/>
-    <pc:docChg chg="undo redo custSel addSld modSld">
-      <pc:chgData name="Gerth Stølting Brodal" userId="04ef4784-6591-4f86-a140-f5c3b108582a" providerId="ADAL" clId="{89EC5210-EF5D-482B-9301-5C971FABFA3E}" dt="2023-03-01T09:03:13.754" v="1856" actId="6549"/>
-      <pc:docMkLst>
-        <pc:docMk/>
-      </pc:docMkLst>
-      <pc:sldChg chg="modNotesTx">
-        <pc:chgData name="Gerth Stølting Brodal" userId="04ef4784-6591-4f86-a140-f5c3b108582a" providerId="ADAL" clId="{89EC5210-EF5D-482B-9301-5C971FABFA3E}" dt="2023-02-22T11:35:00.197" v="1665" actId="20577"/>
-        <pc:sldMkLst>
-          <pc:docMk/>
-          <pc:sldMk cId="3400112957" sldId="543"/>
-        </pc:sldMkLst>
-      </pc:sldChg>
-      <pc:sldChg chg="modSp mod">
-        <pc:chgData name="Gerth Stølting Brodal" userId="04ef4784-6591-4f86-a140-f5c3b108582a" providerId="ADAL" clId="{89EC5210-EF5D-482B-9301-5C971FABFA3E}" dt="2023-02-18T10:43:43.554" v="1027" actId="20577"/>
-        <pc:sldMkLst>
-          <pc:docMk/>
-          <pc:sldMk cId="3628447800" sldId="561"/>
-        </pc:sldMkLst>
-      </pc:sldChg>
-      <pc:sldChg chg="modSp mod">
-        <pc:chgData name="Gerth Stølting Brodal" userId="04ef4784-6591-4f86-a140-f5c3b108582a" providerId="ADAL" clId="{89EC5210-EF5D-482B-9301-5C971FABFA3E}" dt="2023-02-19T18:31:55.092" v="1214"/>
-        <pc:sldMkLst>
-          <pc:docMk/>
-          <pc:sldMk cId="3419193662" sldId="565"/>
-        </pc:sldMkLst>
-      </pc:sldChg>
-      <pc:sldChg chg="modSp mod">
-        <pc:chgData name="Gerth Stølting Brodal" userId="04ef4784-6591-4f86-a140-f5c3b108582a" providerId="ADAL" clId="{89EC5210-EF5D-482B-9301-5C971FABFA3E}" dt="2023-02-19T18:35:09.228" v="1216" actId="207"/>
-        <pc:sldMkLst>
-          <pc:docMk/>
-          <pc:sldMk cId="3627704936" sldId="566"/>
-        </pc:sldMkLst>
-      </pc:sldChg>
-      <pc:sldChg chg="modSp mod">
-        <pc:chgData name="Gerth Stølting Brodal" userId="04ef4784-6591-4f86-a140-f5c3b108582a" providerId="ADAL" clId="{89EC5210-EF5D-482B-9301-5C971FABFA3E}" dt="2023-02-19T18:38:43.530" v="1265" actId="1076"/>
-        <pc:sldMkLst>
-          <pc:docMk/>
-          <pc:sldMk cId="2099313752" sldId="567"/>
-        </pc:sldMkLst>
-      </pc:sldChg>
-      <pc:sldChg chg="modSp mod">
-        <pc:chgData name="Gerth Stølting Brodal" userId="04ef4784-6591-4f86-a140-f5c3b108582a" providerId="ADAL" clId="{89EC5210-EF5D-482B-9301-5C971FABFA3E}" dt="2023-02-18T10:44:22.250" v="1029" actId="20577"/>
-        <pc:sldMkLst>
-          <pc:docMk/>
-          <pc:sldMk cId="100858788" sldId="568"/>
-        </pc:sldMkLst>
-      </pc:sldChg>
-      <pc:sldChg chg="modSp mod modNotesTx">
-        <pc:chgData name="Gerth Stølting Brodal" userId="04ef4784-6591-4f86-a140-f5c3b108582a" providerId="ADAL" clId="{89EC5210-EF5D-482B-9301-5C971FABFA3E}" dt="2023-02-22T12:23:42.801" v="1766" actId="20577"/>
-        <pc:sldMkLst>
-          <pc:docMk/>
-          <pc:sldMk cId="4291965801" sldId="571"/>
-        </pc:sldMkLst>
-      </pc:sldChg>
-      <pc:sldChg chg="modNotesTx">
-        <pc:chgData name="Gerth Stølting Brodal" userId="04ef4784-6591-4f86-a140-f5c3b108582a" providerId="ADAL" clId="{89EC5210-EF5D-482B-9301-5C971FABFA3E}" dt="2023-02-18T08:20:47.793" v="20" actId="20577"/>
-        <pc:sldMkLst>
-          <pc:docMk/>
-          <pc:sldMk cId="1437013171" sldId="572"/>
-        </pc:sldMkLst>
-      </pc:sldChg>
-      <pc:sldChg chg="modNotesTx">
-        <pc:chgData name="Gerth Stølting Brodal" userId="04ef4784-6591-4f86-a140-f5c3b108582a" providerId="ADAL" clId="{89EC5210-EF5D-482B-9301-5C971FABFA3E}" dt="2023-02-18T08:21:34.319" v="34" actId="313"/>
-        <pc:sldMkLst>
-          <pc:docMk/>
-          <pc:sldMk cId="2250928843" sldId="573"/>
-        </pc:sldMkLst>
-      </pc:sldChg>
-      <pc:sldChg chg="modSp mod">
-        <pc:chgData name="Gerth Stølting Brodal" userId="04ef4784-6591-4f86-a140-f5c3b108582a" providerId="ADAL" clId="{89EC5210-EF5D-482B-9301-5C971FABFA3E}" dt="2023-02-18T08:37:20.565" v="114" actId="20577"/>
-        <pc:sldMkLst>
-          <pc:docMk/>
-          <pc:sldMk cId="1619579666" sldId="574"/>
-        </pc:sldMkLst>
-      </pc:sldChg>
-      <pc:sldChg chg="modSp mod modNotesTx">
-        <pc:chgData name="Gerth Stølting Brodal" userId="04ef4784-6591-4f86-a140-f5c3b108582a" providerId="ADAL" clId="{89EC5210-EF5D-482B-9301-5C971FABFA3E}" dt="2023-02-22T12:17:11.118" v="1730" actId="20577"/>
-        <pc:sldMkLst>
-          <pc:docMk/>
-          <pc:sldMk cId="2854255146" sldId="575"/>
-        </pc:sldMkLst>
-      </pc:sldChg>
-      <pc:sldChg chg="modSp mod">
-        <pc:chgData name="Gerth Stølting Brodal" userId="04ef4784-6591-4f86-a140-f5c3b108582a" providerId="ADAL" clId="{89EC5210-EF5D-482B-9301-5C971FABFA3E}" dt="2023-02-22T12:37:41.659" v="1849" actId="27636"/>
-        <pc:sldMkLst>
-          <pc:docMk/>
-          <pc:sldMk cId="3579293872" sldId="577"/>
-        </pc:sldMkLst>
-      </pc:sldChg>
-      <pc:sldChg chg="modSp mod">
-        <pc:chgData name="Gerth Stølting Brodal" userId="04ef4784-6591-4f86-a140-f5c3b108582a" providerId="ADAL" clId="{89EC5210-EF5D-482B-9301-5C971FABFA3E}" dt="2023-02-19T18:46:39.801" v="1399" actId="1076"/>
-        <pc:sldMkLst>
-          <pc:docMk/>
-          <pc:sldMk cId="4009993959" sldId="582"/>
-        </pc:sldMkLst>
-      </pc:sldChg>
-      <pc:sldChg chg="modSp mod modNotesTx">
-        <pc:chgData name="Gerth Stølting Brodal" userId="04ef4784-6591-4f86-a140-f5c3b108582a" providerId="ADAL" clId="{89EC5210-EF5D-482B-9301-5C971FABFA3E}" dt="2023-02-18T10:52:08.355" v="1148" actId="1035"/>
-        <pc:sldMkLst>
-          <pc:docMk/>
-          <pc:sldMk cId="1896777206" sldId="585"/>
-        </pc:sldMkLst>
-      </pc:sldChg>
-      <pc:sldChg chg="modSp mod modNotesTx">
-        <pc:chgData name="Gerth Stølting Brodal" userId="04ef4784-6591-4f86-a140-f5c3b108582a" providerId="ADAL" clId="{89EC5210-EF5D-482B-9301-5C971FABFA3E}" dt="2023-02-22T12:28:01.782" v="1821" actId="20577"/>
-        <pc:sldMkLst>
-          <pc:docMk/>
-          <pc:sldMk cId="653558519" sldId="586"/>
-        </pc:sldMkLst>
-      </pc:sldChg>
-      <pc:sldChg chg="modSp mod">
-        <pc:chgData name="Gerth Stølting Brodal" userId="04ef4784-6591-4f86-a140-f5c3b108582a" providerId="ADAL" clId="{89EC5210-EF5D-482B-9301-5C971FABFA3E}" dt="2023-02-18T08:13:17.127" v="6" actId="20577"/>
-        <pc:sldMkLst>
-          <pc:docMk/>
-          <pc:sldMk cId="4039368805" sldId="589"/>
-        </pc:sldMkLst>
-      </pc:sldChg>
-      <pc:sldChg chg="modSp mod modNotesTx">
-        <pc:chgData name="Gerth Stølting Brodal" userId="04ef4784-6591-4f86-a140-f5c3b108582a" providerId="ADAL" clId="{89EC5210-EF5D-482B-9301-5C971FABFA3E}" dt="2023-03-01T09:03:13.754" v="1856" actId="6549"/>
-        <pc:sldMkLst>
-          <pc:docMk/>
-          <pc:sldMk cId="3860775354" sldId="590"/>
-        </pc:sldMkLst>
-      </pc:sldChg>
-      <pc:sldChg chg="addSp modSp add mod modNotesTx">
-        <pc:chgData name="Gerth Stølting Brodal" userId="04ef4784-6591-4f86-a140-f5c3b108582a" providerId="ADAL" clId="{89EC5210-EF5D-482B-9301-5C971FABFA3E}" dt="2023-02-22T12:37:38.612" v="1843" actId="207"/>
-        <pc:sldMkLst>
-          <pc:docMk/>
-          <pc:sldMk cId="4032496496" sldId="592"/>
-        </pc:sldMkLst>
-      </pc:sldChg>
-    </pc:docChg>
-  </pc:docChgLst>
-  <pc:docChgLst>
-    <pc:chgData name="Gerth Stølting Brodal" userId="04ef4784-6591-4f86-a140-f5c3b108582a" providerId="ADAL" clId="{F3ECE93C-6A89-44E4-B55D-A95418A85687}"/>
-    <pc:docChg chg="modSld">
-      <pc:chgData name="Gerth Stølting Brodal" userId="04ef4784-6591-4f86-a140-f5c3b108582a" providerId="ADAL" clId="{F3ECE93C-6A89-44E4-B55D-A95418A85687}" dt="2025-02-19T08:39:04.683" v="0" actId="115"/>
-      <pc:docMkLst>
-        <pc:docMk/>
-      </pc:docMkLst>
-      <pc:sldChg chg="modSp mod">
-        <pc:chgData name="Gerth Stølting Brodal" userId="04ef4784-6591-4f86-a140-f5c3b108582a" providerId="ADAL" clId="{F3ECE93C-6A89-44E4-B55D-A95418A85687}" dt="2025-02-19T08:39:04.683" v="0" actId="115"/>
-        <pc:sldMkLst>
-          <pc:docMk/>
-          <pc:sldMk cId="905431858" sldId="569"/>
         </pc:sldMkLst>
       </pc:sldChg>
     </pc:docChg>
@@ -690,7 +284,7 @@
           <a:p>
             <a:fld id="{FB1A172F-81D4-4DC4-9113-1DBD56EC3646}" type="datetimeFigureOut">
               <a:rPr lang="en-US" smtClean="0"/>
-              <a:t>10/27/2025</a:t>
+              <a:t>2/18/2026</a:t>
             </a:fld>
             <a:endParaRPr lang="en-US"/>
           </a:p>
@@ -1658,6 +1252,24 @@
           <a:lstStyle/>
           <a:p>
             <a:r>
+              <a:rPr lang="en-US" dirty="0"/>
+              <a:t>print also has keyword arguments </a:t>
+            </a:r>
+            <a:r>
+              <a:rPr lang="en-US" b="1" dirty="0"/>
+              <a:t>flush</a:t>
+            </a:r>
+            <a:r>
+              <a:rPr lang="en-US" dirty="0"/>
+              <a:t> and </a:t>
+            </a:r>
+            <a:r>
+              <a:rPr lang="en-US" b="1" dirty="0"/>
+              <a:t>file</a:t>
+            </a:r>
+          </a:p>
+          <a:p>
+            <a:r>
               <a:rPr lang="pl-PL" dirty="0"/>
               <a:t>def mp(*arg, **kw):</a:t>
             </a:r>
@@ -2303,6 +1915,14 @@
             </a:r>
             <a:r>
               <a:rPr lang="da-DK" dirty="0" err="1"/>
+              <a:t>if</a:t>
+            </a:r>
+            <a:r>
+              <a:rPr lang="da-DK" dirty="0"/>
+              <a:t> </a:t>
+            </a:r>
+            <a:r>
+              <a:rPr lang="da-DK" dirty="0" err="1"/>
               <a:t>immutable</a:t>
             </a:r>
             <a:r>
@@ -2883,7 +2503,23 @@
           <a:p>
             <a:r>
               <a:rPr lang="en-US" dirty="0"/>
-              <a:t>Note that a,*b, c = 1,2,3,4,5 creates b as a list instead of a tuple, and there can be more variables after * </a:t>
+              <a:t>Note that a</a:t>
+            </a:r>
+            <a:r>
+              <a:rPr lang="en-US" b="1" dirty="0"/>
+              <a:t>,*b</a:t>
+            </a:r>
+            <a:r>
+              <a:rPr lang="en-US" dirty="0"/>
+              <a:t>, c = 1,2,3,4,5 creates b as a </a:t>
+            </a:r>
+            <a:r>
+              <a:rPr lang="en-US" b="1" dirty="0"/>
+              <a:t>list</a:t>
+            </a:r>
+            <a:r>
+              <a:rPr lang="en-US" dirty="0"/>
+              <a:t> instead of a tuple, and there can be more variables after * </a:t>
             </a:r>
           </a:p>
         </p:txBody>
@@ -3804,7 +3440,7 @@
           <a:p>
             <a:fld id="{0560A9CD-0304-4E0B-9E82-E7E0115DE05B}" type="datetimeFigureOut">
               <a:rPr lang="en-US" smtClean="0"/>
-              <a:t>10/27/2025</a:t>
+              <a:t>2/18/2026</a:t>
             </a:fld>
             <a:endParaRPr lang="en-US"/>
           </a:p>
@@ -3972,7 +3608,7 @@
           <a:p>
             <a:fld id="{0560A9CD-0304-4E0B-9E82-E7E0115DE05B}" type="datetimeFigureOut">
               <a:rPr lang="en-US" smtClean="0"/>
-              <a:t>10/27/2025</a:t>
+              <a:t>2/18/2026</a:t>
             </a:fld>
             <a:endParaRPr lang="en-US"/>
           </a:p>
@@ -4150,7 +3786,7 @@
           <a:p>
             <a:fld id="{0560A9CD-0304-4E0B-9E82-E7E0115DE05B}" type="datetimeFigureOut">
               <a:rPr lang="en-US" smtClean="0"/>
-              <a:t>10/27/2025</a:t>
+              <a:t>2/18/2026</a:t>
             </a:fld>
             <a:endParaRPr lang="en-US"/>
           </a:p>
@@ -4333,7 +3969,7 @@
           <a:p>
             <a:fld id="{0560A9CD-0304-4E0B-9E82-E7E0115DE05B}" type="datetimeFigureOut">
               <a:rPr lang="en-US" smtClean="0"/>
-              <a:t>10/27/2025</a:t>
+              <a:t>2/18/2026</a:t>
             </a:fld>
             <a:endParaRPr lang="en-US"/>
           </a:p>
@@ -4578,7 +4214,7 @@
           <a:p>
             <a:fld id="{0560A9CD-0304-4E0B-9E82-E7E0115DE05B}" type="datetimeFigureOut">
               <a:rPr lang="en-US" smtClean="0"/>
-              <a:t>10/27/2025</a:t>
+              <a:t>2/18/2026</a:t>
             </a:fld>
             <a:endParaRPr lang="en-US"/>
           </a:p>
@@ -4807,7 +4443,7 @@
           <a:p>
             <a:fld id="{0560A9CD-0304-4E0B-9E82-E7E0115DE05B}" type="datetimeFigureOut">
               <a:rPr lang="en-US" smtClean="0"/>
-              <a:t>10/27/2025</a:t>
+              <a:t>2/18/2026</a:t>
             </a:fld>
             <a:endParaRPr lang="en-US"/>
           </a:p>
@@ -5171,7 +4807,7 @@
           <a:p>
             <a:fld id="{0560A9CD-0304-4E0B-9E82-E7E0115DE05B}" type="datetimeFigureOut">
               <a:rPr lang="en-US" smtClean="0"/>
-              <a:t>10/27/2025</a:t>
+              <a:t>2/18/2026</a:t>
             </a:fld>
             <a:endParaRPr lang="en-US"/>
           </a:p>
@@ -5288,7 +4924,7 @@
           <a:p>
             <a:fld id="{0560A9CD-0304-4E0B-9E82-E7E0115DE05B}" type="datetimeFigureOut">
               <a:rPr lang="en-US" smtClean="0"/>
-              <a:t>10/27/2025</a:t>
+              <a:t>2/18/2026</a:t>
             </a:fld>
             <a:endParaRPr lang="en-US"/>
           </a:p>
@@ -5383,7 +5019,7 @@
           <a:p>
             <a:fld id="{0560A9CD-0304-4E0B-9E82-E7E0115DE05B}" type="datetimeFigureOut">
               <a:rPr lang="en-US" smtClean="0"/>
-              <a:t>10/27/2025</a:t>
+              <a:t>2/18/2026</a:t>
             </a:fld>
             <a:endParaRPr lang="en-US"/>
           </a:p>
@@ -5658,7 +5294,7 @@
           <a:p>
             <a:fld id="{0560A9CD-0304-4E0B-9E82-E7E0115DE05B}" type="datetimeFigureOut">
               <a:rPr lang="en-US" smtClean="0"/>
-              <a:t>10/27/2025</a:t>
+              <a:t>2/18/2026</a:t>
             </a:fld>
             <a:endParaRPr lang="en-US"/>
           </a:p>
@@ -5910,7 +5546,7 @@
           <a:p>
             <a:fld id="{0560A9CD-0304-4E0B-9E82-E7E0115DE05B}" type="datetimeFigureOut">
               <a:rPr lang="en-US" smtClean="0"/>
-              <a:t>10/27/2025</a:t>
+              <a:t>2/18/2026</a:t>
             </a:fld>
             <a:endParaRPr lang="en-US"/>
           </a:p>
@@ -6121,7 +5757,7 @@
           <a:p>
             <a:fld id="{0560A9CD-0304-4E0B-9E82-E7E0115DE05B}" type="datetimeFigureOut">
               <a:rPr lang="en-US" smtClean="0"/>
-              <a:t>10/27/2025</a:t>
+              <a:t>2/18/2026</a:t>
             </a:fld>
             <a:endParaRPr lang="en-US"/>
           </a:p>
@@ -11285,7 +10921,19 @@
               <a:rPr lang="da-DK" dirty="0">
                 <a:cs typeface="Courier New" panose="02070309020205020404" pitchFamily="49" charset="0"/>
               </a:rPr>
-              <a:t>Default arguments </a:t>
+              <a:t>Default </a:t>
+            </a:r>
+            <a:r>
+              <a:rPr lang="da-DK" dirty="0" err="1">
+                <a:cs typeface="Courier New" panose="02070309020205020404" pitchFamily="49" charset="0"/>
+              </a:rPr>
+              <a:t>values</a:t>
+            </a:r>
+            <a:r>
+              <a:rPr lang="da-DK" dirty="0">
+                <a:cs typeface="Courier New" panose="02070309020205020404" pitchFamily="49" charset="0"/>
+              </a:rPr>
+              <a:t> </a:t>
             </a:r>
             <a:r>
               <a:rPr lang="da-DK" dirty="0" err="1">

</xml_diff>